<commit_message>
Updates, Small bug fixes
</commit_message>
<xml_diff>
--- a/Images/Figures_PPT/Box_Plot_C_Score.pptx
+++ b/Images/Figures_PPT/Box_Plot_C_Score.pptx
@@ -2298,8 +2298,8 @@
           </p:nvSpPr>
           <p:spPr>
             <a:xfrm>
-              <a:off x="914400" y="914400"/>
-              <a:ext cx="9144000" cy="6400800"/>
+              <a:off x="10058399" y="914400"/>
+              <a:ext cx="0" cy="6400800"/>
             </a:xfrm>
             <a:prstGeom prst="rect">
               <a:avLst/>
@@ -2333,8 +2333,8 @@
           </p:nvSpPr>
           <p:spPr>
             <a:xfrm>
-              <a:off x="1397280" y="1407846"/>
-              <a:ext cx="8591530" cy="5507419"/>
+              <a:off x="1371700" y="1392990"/>
+              <a:ext cx="8617110" cy="5534432"/>
             </a:xfrm>
             <a:prstGeom prst="rect">
               <a:avLst/>
@@ -2359,21 +2359,21 @@
           </p:nvSpPr>
           <p:spPr>
             <a:xfrm>
-              <a:off x="1397280" y="6043471"/>
-              <a:ext cx="8591530" cy="0"/>
-            </a:xfrm>
-            <a:custGeom>
-              <a:avLst/>
-              <a:pathLst>
-                <a:path w="8591530" h="0">
-                  <a:moveTo>
-                    <a:pt x="0" y="0"/>
-                  </a:moveTo>
-                  <a:lnTo>
-                    <a:pt x="8591530" y="0"/>
-                  </a:lnTo>
-                  <a:lnTo>
-                    <a:pt x="8591530" y="0"/>
+              <a:off x="1371700" y="6051351"/>
+              <a:ext cx="8617110" cy="0"/>
+            </a:xfrm>
+            <a:custGeom>
+              <a:avLst/>
+              <a:pathLst>
+                <a:path w="8617110" h="0">
+                  <a:moveTo>
+                    <a:pt x="0" y="0"/>
+                  </a:moveTo>
+                  <a:lnTo>
+                    <a:pt x="8617110" y="0"/>
+                  </a:lnTo>
+                  <a:lnTo>
+                    <a:pt x="8617110" y="0"/>
                   </a:lnTo>
                 </a:path>
               </a:pathLst>
@@ -2402,21 +2402,21 @@
           </p:nvSpPr>
           <p:spPr>
             <a:xfrm>
-              <a:off x="1397280" y="4790532"/>
-              <a:ext cx="8591530" cy="0"/>
-            </a:xfrm>
-            <a:custGeom>
-              <a:avLst/>
-              <a:pathLst>
-                <a:path w="8591530" h="0">
-                  <a:moveTo>
-                    <a:pt x="0" y="0"/>
-                  </a:moveTo>
-                  <a:lnTo>
-                    <a:pt x="8591530" y="0"/>
-                  </a:lnTo>
-                  <a:lnTo>
-                    <a:pt x="8591530" y="0"/>
+              <a:off x="1371700" y="4792266"/>
+              <a:ext cx="8617110" cy="0"/>
+            </a:xfrm>
+            <a:custGeom>
+              <a:avLst/>
+              <a:pathLst>
+                <a:path w="8617110" h="0">
+                  <a:moveTo>
+                    <a:pt x="0" y="0"/>
+                  </a:moveTo>
+                  <a:lnTo>
+                    <a:pt x="8617110" y="0"/>
+                  </a:lnTo>
+                  <a:lnTo>
+                    <a:pt x="8617110" y="0"/>
                   </a:lnTo>
                 </a:path>
               </a:pathLst>
@@ -2445,21 +2445,21 @@
           </p:nvSpPr>
           <p:spPr>
             <a:xfrm>
-              <a:off x="1397280" y="3537592"/>
-              <a:ext cx="8591530" cy="0"/>
-            </a:xfrm>
-            <a:custGeom>
-              <a:avLst/>
-              <a:pathLst>
-                <a:path w="8591530" h="0">
-                  <a:moveTo>
-                    <a:pt x="0" y="0"/>
-                  </a:moveTo>
-                  <a:lnTo>
-                    <a:pt x="8591530" y="0"/>
-                  </a:lnTo>
-                  <a:lnTo>
-                    <a:pt x="8591530" y="0"/>
+              <a:off x="1371700" y="3533181"/>
+              <a:ext cx="8617110" cy="0"/>
+            </a:xfrm>
+            <a:custGeom>
+              <a:avLst/>
+              <a:pathLst>
+                <a:path w="8617110" h="0">
+                  <a:moveTo>
+                    <a:pt x="0" y="0"/>
+                  </a:moveTo>
+                  <a:lnTo>
+                    <a:pt x="8617110" y="0"/>
+                  </a:lnTo>
+                  <a:lnTo>
+                    <a:pt x="8617110" y="0"/>
                   </a:lnTo>
                 </a:path>
               </a:pathLst>
@@ -2488,21 +2488,21 @@
           </p:nvSpPr>
           <p:spPr>
             <a:xfrm>
-              <a:off x="1397280" y="2284653"/>
-              <a:ext cx="8591530" cy="0"/>
-            </a:xfrm>
-            <a:custGeom>
-              <a:avLst/>
-              <a:pathLst>
-                <a:path w="8591530" h="0">
-                  <a:moveTo>
-                    <a:pt x="0" y="0"/>
-                  </a:moveTo>
-                  <a:lnTo>
-                    <a:pt x="8591530" y="0"/>
-                  </a:lnTo>
-                  <a:lnTo>
-                    <a:pt x="8591530" y="0"/>
+              <a:off x="1371700" y="2274097"/>
+              <a:ext cx="8617110" cy="0"/>
+            </a:xfrm>
+            <a:custGeom>
+              <a:avLst/>
+              <a:pathLst>
+                <a:path w="8617110" h="0">
+                  <a:moveTo>
+                    <a:pt x="0" y="0"/>
+                  </a:moveTo>
+                  <a:lnTo>
+                    <a:pt x="8617110" y="0"/>
+                  </a:lnTo>
+                  <a:lnTo>
+                    <a:pt x="8617110" y="0"/>
                   </a:lnTo>
                 </a:path>
               </a:pathLst>
@@ -2531,21 +2531,21 @@
           </p:nvSpPr>
           <p:spPr>
             <a:xfrm>
-              <a:off x="1397280" y="6669941"/>
-              <a:ext cx="8591530" cy="0"/>
-            </a:xfrm>
-            <a:custGeom>
-              <a:avLst/>
-              <a:pathLst>
-                <a:path w="8591530" h="0">
-                  <a:moveTo>
-                    <a:pt x="0" y="0"/>
-                  </a:moveTo>
-                  <a:lnTo>
-                    <a:pt x="8591530" y="0"/>
-                  </a:lnTo>
-                  <a:lnTo>
-                    <a:pt x="8591530" y="0"/>
+              <a:off x="1371700" y="6680893"/>
+              <a:ext cx="8617110" cy="0"/>
+            </a:xfrm>
+            <a:custGeom>
+              <a:avLst/>
+              <a:pathLst>
+                <a:path w="8617110" h="0">
+                  <a:moveTo>
+                    <a:pt x="0" y="0"/>
+                  </a:moveTo>
+                  <a:lnTo>
+                    <a:pt x="8617110" y="0"/>
+                  </a:lnTo>
+                  <a:lnTo>
+                    <a:pt x="8617110" y="0"/>
                   </a:lnTo>
                 </a:path>
               </a:pathLst>
@@ -2574,21 +2574,21 @@
           </p:nvSpPr>
           <p:spPr>
             <a:xfrm>
-              <a:off x="1397280" y="5417001"/>
-              <a:ext cx="8591530" cy="0"/>
-            </a:xfrm>
-            <a:custGeom>
-              <a:avLst/>
-              <a:pathLst>
-                <a:path w="8591530" h="0">
-                  <a:moveTo>
-                    <a:pt x="0" y="0"/>
-                  </a:moveTo>
-                  <a:lnTo>
-                    <a:pt x="8591530" y="0"/>
-                  </a:lnTo>
-                  <a:lnTo>
-                    <a:pt x="8591530" y="0"/>
+              <a:off x="1371700" y="5421808"/>
+              <a:ext cx="8617110" cy="0"/>
+            </a:xfrm>
+            <a:custGeom>
+              <a:avLst/>
+              <a:pathLst>
+                <a:path w="8617110" h="0">
+                  <a:moveTo>
+                    <a:pt x="0" y="0"/>
+                  </a:moveTo>
+                  <a:lnTo>
+                    <a:pt x="8617110" y="0"/>
+                  </a:lnTo>
+                  <a:lnTo>
+                    <a:pt x="8617110" y="0"/>
                   </a:lnTo>
                 </a:path>
               </a:pathLst>
@@ -2617,21 +2617,21 @@
           </p:nvSpPr>
           <p:spPr>
             <a:xfrm>
-              <a:off x="1397280" y="4164062"/>
-              <a:ext cx="8591530" cy="0"/>
-            </a:xfrm>
-            <a:custGeom>
-              <a:avLst/>
-              <a:pathLst>
-                <a:path w="8591530" h="0">
-                  <a:moveTo>
-                    <a:pt x="0" y="0"/>
-                  </a:moveTo>
-                  <a:lnTo>
-                    <a:pt x="8591530" y="0"/>
-                  </a:lnTo>
-                  <a:lnTo>
-                    <a:pt x="8591530" y="0"/>
+              <a:off x="1371700" y="4162724"/>
+              <a:ext cx="8617110" cy="0"/>
+            </a:xfrm>
+            <a:custGeom>
+              <a:avLst/>
+              <a:pathLst>
+                <a:path w="8617110" h="0">
+                  <a:moveTo>
+                    <a:pt x="0" y="0"/>
+                  </a:moveTo>
+                  <a:lnTo>
+                    <a:pt x="8617110" y="0"/>
+                  </a:lnTo>
+                  <a:lnTo>
+                    <a:pt x="8617110" y="0"/>
                   </a:lnTo>
                 </a:path>
               </a:pathLst>
@@ -2660,21 +2660,21 @@
           </p:nvSpPr>
           <p:spPr>
             <a:xfrm>
-              <a:off x="1397280" y="2911123"/>
-              <a:ext cx="8591530" cy="0"/>
-            </a:xfrm>
-            <a:custGeom>
-              <a:avLst/>
-              <a:pathLst>
-                <a:path w="8591530" h="0">
-                  <a:moveTo>
-                    <a:pt x="0" y="0"/>
-                  </a:moveTo>
-                  <a:lnTo>
-                    <a:pt x="8591530" y="0"/>
-                  </a:lnTo>
-                  <a:lnTo>
-                    <a:pt x="8591530" y="0"/>
+              <a:off x="1371700" y="2903639"/>
+              <a:ext cx="8617110" cy="0"/>
+            </a:xfrm>
+            <a:custGeom>
+              <a:avLst/>
+              <a:pathLst>
+                <a:path w="8617110" h="0">
+                  <a:moveTo>
+                    <a:pt x="0" y="0"/>
+                  </a:moveTo>
+                  <a:lnTo>
+                    <a:pt x="8617110" y="0"/>
+                  </a:lnTo>
+                  <a:lnTo>
+                    <a:pt x="8617110" y="0"/>
                   </a:lnTo>
                 </a:path>
               </a:pathLst>
@@ -2703,21 +2703,21 @@
           </p:nvSpPr>
           <p:spPr>
             <a:xfrm>
-              <a:off x="1397280" y="1658184"/>
-              <a:ext cx="8591530" cy="0"/>
-            </a:xfrm>
-            <a:custGeom>
-              <a:avLst/>
-              <a:pathLst>
-                <a:path w="8591530" h="0">
-                  <a:moveTo>
-                    <a:pt x="0" y="0"/>
-                  </a:moveTo>
-                  <a:lnTo>
-                    <a:pt x="8591530" y="0"/>
-                  </a:lnTo>
-                  <a:lnTo>
-                    <a:pt x="8591530" y="0"/>
+              <a:off x="1371700" y="1644555"/>
+              <a:ext cx="8617110" cy="0"/>
+            </a:xfrm>
+            <a:custGeom>
+              <a:avLst/>
+              <a:pathLst>
+                <a:path w="8617110" h="0">
+                  <a:moveTo>
+                    <a:pt x="0" y="0"/>
+                  </a:moveTo>
+                  <a:lnTo>
+                    <a:pt x="8617110" y="0"/>
+                  </a:lnTo>
+                  <a:lnTo>
+                    <a:pt x="8617110" y="0"/>
                   </a:lnTo>
                 </a:path>
               </a:pathLst>
@@ -2746,15 +2746,15 @@
           </p:nvSpPr>
           <p:spPr>
             <a:xfrm>
-              <a:off x="2025928" y="1407846"/>
-              <a:ext cx="0" cy="5507419"/>
-            </a:xfrm>
-            <a:custGeom>
-              <a:avLst/>
-              <a:pathLst>
-                <a:path w="0" h="5507419">
-                  <a:moveTo>
-                    <a:pt x="0" y="5507419"/>
+              <a:off x="2002220" y="1392990"/>
+              <a:ext cx="0" cy="5534432"/>
+            </a:xfrm>
+            <a:custGeom>
+              <a:avLst/>
+              <a:pathLst>
+                <a:path w="0" h="5534432">
+                  <a:moveTo>
+                    <a:pt x="0" y="5534432"/>
                   </a:moveTo>
                   <a:lnTo>
                     <a:pt x="0" y="0"/>
@@ -2789,15 +2789,15 @@
           </p:nvSpPr>
           <p:spPr>
             <a:xfrm>
-              <a:off x="3073676" y="1407846"/>
-              <a:ext cx="0" cy="5507419"/>
-            </a:xfrm>
-            <a:custGeom>
-              <a:avLst/>
-              <a:pathLst>
-                <a:path w="0" h="5507419">
-                  <a:moveTo>
-                    <a:pt x="0" y="5507419"/>
+              <a:off x="3053087" y="1392990"/>
+              <a:ext cx="0" cy="5534432"/>
+            </a:xfrm>
+            <a:custGeom>
+              <a:avLst/>
+              <a:pathLst>
+                <a:path w="0" h="5534432">
+                  <a:moveTo>
+                    <a:pt x="0" y="5534432"/>
                   </a:moveTo>
                   <a:lnTo>
                     <a:pt x="0" y="0"/>
@@ -2832,15 +2832,15 @@
           </p:nvSpPr>
           <p:spPr>
             <a:xfrm>
-              <a:off x="4121424" y="1407846"/>
-              <a:ext cx="0" cy="5507419"/>
-            </a:xfrm>
-            <a:custGeom>
-              <a:avLst/>
-              <a:pathLst>
-                <a:path w="0" h="5507419">
-                  <a:moveTo>
-                    <a:pt x="0" y="5507419"/>
+              <a:off x="4103955" y="1392990"/>
+              <a:ext cx="0" cy="5534432"/>
+            </a:xfrm>
+            <a:custGeom>
+              <a:avLst/>
+              <a:pathLst>
+                <a:path w="0" h="5534432">
+                  <a:moveTo>
+                    <a:pt x="0" y="5534432"/>
                   </a:moveTo>
                   <a:lnTo>
                     <a:pt x="0" y="0"/>
@@ -2875,15 +2875,15 @@
           </p:nvSpPr>
           <p:spPr>
             <a:xfrm>
-              <a:off x="5169171" y="1407846"/>
-              <a:ext cx="0" cy="5507419"/>
-            </a:xfrm>
-            <a:custGeom>
-              <a:avLst/>
-              <a:pathLst>
-                <a:path w="0" h="5507419">
-                  <a:moveTo>
-                    <a:pt x="0" y="5507419"/>
+              <a:off x="5154822" y="1392990"/>
+              <a:ext cx="0" cy="5534432"/>
+            </a:xfrm>
+            <a:custGeom>
+              <a:avLst/>
+              <a:pathLst>
+                <a:path w="0" h="5534432">
+                  <a:moveTo>
+                    <a:pt x="0" y="5534432"/>
                   </a:moveTo>
                   <a:lnTo>
                     <a:pt x="0" y="0"/>
@@ -2918,15 +2918,15 @@
           </p:nvSpPr>
           <p:spPr>
             <a:xfrm>
-              <a:off x="6216919" y="1407846"/>
-              <a:ext cx="0" cy="5507419"/>
-            </a:xfrm>
-            <a:custGeom>
-              <a:avLst/>
-              <a:pathLst>
-                <a:path w="0" h="5507419">
-                  <a:moveTo>
-                    <a:pt x="0" y="5507419"/>
+              <a:off x="6205689" y="1392990"/>
+              <a:ext cx="0" cy="5534432"/>
+            </a:xfrm>
+            <a:custGeom>
+              <a:avLst/>
+              <a:pathLst>
+                <a:path w="0" h="5534432">
+                  <a:moveTo>
+                    <a:pt x="0" y="5534432"/>
                   </a:moveTo>
                   <a:lnTo>
                     <a:pt x="0" y="0"/>
@@ -2961,15 +2961,15 @@
           </p:nvSpPr>
           <p:spPr>
             <a:xfrm>
-              <a:off x="7264667" y="1407846"/>
-              <a:ext cx="0" cy="5507419"/>
-            </a:xfrm>
-            <a:custGeom>
-              <a:avLst/>
-              <a:pathLst>
-                <a:path w="0" h="5507419">
-                  <a:moveTo>
-                    <a:pt x="0" y="5507419"/>
+              <a:off x="7256556" y="1392990"/>
+              <a:ext cx="0" cy="5534432"/>
+            </a:xfrm>
+            <a:custGeom>
+              <a:avLst/>
+              <a:pathLst>
+                <a:path w="0" h="5534432">
+                  <a:moveTo>
+                    <a:pt x="0" y="5534432"/>
                   </a:moveTo>
                   <a:lnTo>
                     <a:pt x="0" y="0"/>
@@ -3004,15 +3004,15 @@
           </p:nvSpPr>
           <p:spPr>
             <a:xfrm>
-              <a:off x="8312414" y="1407846"/>
-              <a:ext cx="0" cy="5507419"/>
-            </a:xfrm>
-            <a:custGeom>
-              <a:avLst/>
-              <a:pathLst>
-                <a:path w="0" h="5507419">
-                  <a:moveTo>
-                    <a:pt x="0" y="5507419"/>
+              <a:off x="8307423" y="1392990"/>
+              <a:ext cx="0" cy="5534432"/>
+            </a:xfrm>
+            <a:custGeom>
+              <a:avLst/>
+              <a:pathLst>
+                <a:path w="0" h="5534432">
+                  <a:moveTo>
+                    <a:pt x="0" y="5534432"/>
                   </a:moveTo>
                   <a:lnTo>
                     <a:pt x="0" y="0"/>
@@ -3047,15 +3047,15 @@
           </p:nvSpPr>
           <p:spPr>
             <a:xfrm>
-              <a:off x="9360162" y="1407846"/>
-              <a:ext cx="0" cy="5507419"/>
-            </a:xfrm>
-            <a:custGeom>
-              <a:avLst/>
-              <a:pathLst>
-                <a:path w="0" h="5507419">
-                  <a:moveTo>
-                    <a:pt x="0" y="5507419"/>
+              <a:off x="9358290" y="1392990"/>
+              <a:ext cx="0" cy="5534432"/>
+            </a:xfrm>
+            <a:custGeom>
+              <a:avLst/>
+              <a:pathLst>
+                <a:path w="0" h="5534432">
+                  <a:moveTo>
+                    <a:pt x="0" y="5534432"/>
                   </a:moveTo>
                   <a:lnTo>
                     <a:pt x="0" y="0"/>
@@ -3090,18 +3090,18 @@
           </p:nvSpPr>
           <p:spPr>
             <a:xfrm>
-              <a:off x="1763991" y="1658184"/>
-              <a:ext cx="523873" cy="0"/>
-            </a:xfrm>
-            <a:custGeom>
-              <a:avLst/>
-              <a:pathLst>
-                <a:path w="523873" h="0">
-                  <a:moveTo>
-                    <a:pt x="0" y="0"/>
-                  </a:moveTo>
-                  <a:lnTo>
-                    <a:pt x="523873" y="0"/>
+              <a:off x="1739503" y="1644555"/>
+              <a:ext cx="525433" cy="0"/>
+            </a:xfrm>
+            <a:custGeom>
+              <a:avLst/>
+              <a:pathLst>
+                <a:path w="525433" h="0">
+                  <a:moveTo>
+                    <a:pt x="0" y="0"/>
+                  </a:moveTo>
+                  <a:lnTo>
+                    <a:pt x="525433" y="0"/>
                   </a:lnTo>
                 </a:path>
               </a:pathLst>
@@ -3130,18 +3130,18 @@
           </p:nvSpPr>
           <p:spPr>
             <a:xfrm>
-              <a:off x="2025928" y="1658184"/>
-              <a:ext cx="0" cy="1846331"/>
-            </a:xfrm>
-            <a:custGeom>
-              <a:avLst/>
-              <a:pathLst>
-                <a:path w="0" h="1846331">
-                  <a:moveTo>
-                    <a:pt x="0" y="0"/>
-                  </a:moveTo>
-                  <a:lnTo>
-                    <a:pt x="0" y="1846331"/>
+              <a:off x="2002220" y="1644555"/>
+              <a:ext cx="0" cy="1855386"/>
+            </a:xfrm>
+            <a:custGeom>
+              <a:avLst/>
+              <a:pathLst>
+                <a:path w="0" h="1855386">
+                  <a:moveTo>
+                    <a:pt x="0" y="0"/>
+                  </a:moveTo>
+                  <a:lnTo>
+                    <a:pt x="0" y="1855386"/>
                   </a:lnTo>
                 </a:path>
               </a:pathLst>
@@ -3170,18 +3170,18 @@
           </p:nvSpPr>
           <p:spPr>
             <a:xfrm>
-              <a:off x="1763991" y="3504515"/>
-              <a:ext cx="523873" cy="0"/>
-            </a:xfrm>
-            <a:custGeom>
-              <a:avLst/>
-              <a:pathLst>
-                <a:path w="523873" h="0">
-                  <a:moveTo>
-                    <a:pt x="0" y="0"/>
-                  </a:moveTo>
-                  <a:lnTo>
-                    <a:pt x="523873" y="0"/>
+              <a:off x="1739503" y="3499942"/>
+              <a:ext cx="525433" cy="0"/>
+            </a:xfrm>
+            <a:custGeom>
+              <a:avLst/>
+              <a:pathLst>
+                <a:path w="525433" h="0">
+                  <a:moveTo>
+                    <a:pt x="0" y="0"/>
+                  </a:moveTo>
+                  <a:lnTo>
+                    <a:pt x="525433" y="0"/>
                   </a:lnTo>
                 </a:path>
               </a:pathLst>
@@ -3210,18 +3210,18 @@
           </p:nvSpPr>
           <p:spPr>
             <a:xfrm>
-              <a:off x="2811739" y="1683242"/>
-              <a:ext cx="523873" cy="0"/>
-            </a:xfrm>
-            <a:custGeom>
-              <a:avLst/>
-              <a:pathLst>
-                <a:path w="523873" h="0">
-                  <a:moveTo>
-                    <a:pt x="0" y="0"/>
-                  </a:moveTo>
-                  <a:lnTo>
-                    <a:pt x="523873" y="0"/>
+              <a:off x="2790371" y="1669736"/>
+              <a:ext cx="525433" cy="0"/>
+            </a:xfrm>
+            <a:custGeom>
+              <a:avLst/>
+              <a:pathLst>
+                <a:path w="525433" h="0">
+                  <a:moveTo>
+                    <a:pt x="0" y="0"/>
+                  </a:moveTo>
+                  <a:lnTo>
+                    <a:pt x="525433" y="0"/>
                   </a:lnTo>
                 </a:path>
               </a:pathLst>
@@ -3250,18 +3250,18 @@
           </p:nvSpPr>
           <p:spPr>
             <a:xfrm>
-              <a:off x="3073676" y="1683242"/>
-              <a:ext cx="0" cy="1189289"/>
-            </a:xfrm>
-            <a:custGeom>
-              <a:avLst/>
-              <a:pathLst>
-                <a:path w="0" h="1189289">
-                  <a:moveTo>
-                    <a:pt x="0" y="0"/>
-                  </a:moveTo>
-                  <a:lnTo>
-                    <a:pt x="0" y="1189289"/>
+              <a:off x="3053087" y="1669736"/>
+              <a:ext cx="0" cy="1195123"/>
+            </a:xfrm>
+            <a:custGeom>
+              <a:avLst/>
+              <a:pathLst>
+                <a:path w="0" h="1195123">
+                  <a:moveTo>
+                    <a:pt x="0" y="0"/>
+                  </a:moveTo>
+                  <a:lnTo>
+                    <a:pt x="0" y="1195123"/>
                   </a:lnTo>
                 </a:path>
               </a:pathLst>
@@ -3290,18 +3290,18 @@
           </p:nvSpPr>
           <p:spPr>
             <a:xfrm>
-              <a:off x="2811739" y="2872532"/>
-              <a:ext cx="523873" cy="0"/>
-            </a:xfrm>
-            <a:custGeom>
-              <a:avLst/>
-              <a:pathLst>
-                <a:path w="523873" h="0">
-                  <a:moveTo>
-                    <a:pt x="0" y="0"/>
-                  </a:moveTo>
-                  <a:lnTo>
-                    <a:pt x="523873" y="0"/>
+              <a:off x="2790371" y="2864859"/>
+              <a:ext cx="525433" cy="0"/>
+            </a:xfrm>
+            <a:custGeom>
+              <a:avLst/>
+              <a:pathLst>
+                <a:path w="525433" h="0">
+                  <a:moveTo>
+                    <a:pt x="0" y="0"/>
+                  </a:moveTo>
+                  <a:lnTo>
+                    <a:pt x="525433" y="0"/>
                   </a:lnTo>
                 </a:path>
               </a:pathLst>
@@ -3330,18 +3330,18 @@
           </p:nvSpPr>
           <p:spPr>
             <a:xfrm>
-              <a:off x="3859487" y="1658184"/>
-              <a:ext cx="523873" cy="0"/>
-            </a:xfrm>
-            <a:custGeom>
-              <a:avLst/>
-              <a:pathLst>
-                <a:path w="523873" h="0">
-                  <a:moveTo>
-                    <a:pt x="0" y="0"/>
-                  </a:moveTo>
-                  <a:lnTo>
-                    <a:pt x="523873" y="0"/>
+              <a:off x="3841238" y="1644555"/>
+              <a:ext cx="525433" cy="0"/>
+            </a:xfrm>
+            <a:custGeom>
+              <a:avLst/>
+              <a:pathLst>
+                <a:path w="525433" h="0">
+                  <a:moveTo>
+                    <a:pt x="0" y="0"/>
+                  </a:moveTo>
+                  <a:lnTo>
+                    <a:pt x="525433" y="0"/>
                   </a:lnTo>
                 </a:path>
               </a:pathLst>
@@ -3370,18 +3370,18 @@
           </p:nvSpPr>
           <p:spPr>
             <a:xfrm>
-              <a:off x="4121424" y="1658184"/>
-              <a:ext cx="0" cy="1195304"/>
-            </a:xfrm>
-            <a:custGeom>
-              <a:avLst/>
-              <a:pathLst>
-                <a:path w="0" h="1195304">
-                  <a:moveTo>
-                    <a:pt x="0" y="0"/>
-                  </a:moveTo>
-                  <a:lnTo>
-                    <a:pt x="0" y="1195304"/>
+              <a:off x="4103955" y="1644555"/>
+              <a:ext cx="0" cy="1201166"/>
+            </a:xfrm>
+            <a:custGeom>
+              <a:avLst/>
+              <a:pathLst>
+                <a:path w="0" h="1201166">
+                  <a:moveTo>
+                    <a:pt x="0" y="0"/>
+                  </a:moveTo>
+                  <a:lnTo>
+                    <a:pt x="0" y="1201166"/>
                   </a:lnTo>
                 </a:path>
               </a:pathLst>
@@ -3410,18 +3410,18 @@
           </p:nvSpPr>
           <p:spPr>
             <a:xfrm>
-              <a:off x="3859487" y="2853488"/>
-              <a:ext cx="523873" cy="0"/>
-            </a:xfrm>
-            <a:custGeom>
-              <a:avLst/>
-              <a:pathLst>
-                <a:path w="523873" h="0">
-                  <a:moveTo>
-                    <a:pt x="0" y="0"/>
-                  </a:moveTo>
-                  <a:lnTo>
-                    <a:pt x="523873" y="0"/>
+              <a:off x="3841238" y="2845721"/>
+              <a:ext cx="525433" cy="0"/>
+            </a:xfrm>
+            <a:custGeom>
+              <a:avLst/>
+              <a:pathLst>
+                <a:path w="525433" h="0">
+                  <a:moveTo>
+                    <a:pt x="0" y="0"/>
+                  </a:moveTo>
+                  <a:lnTo>
+                    <a:pt x="525433" y="0"/>
                   </a:lnTo>
                 </a:path>
               </a:pathLst>
@@ -3450,18 +3450,18 @@
           </p:nvSpPr>
           <p:spPr>
             <a:xfrm>
-              <a:off x="4907234" y="2680081"/>
-              <a:ext cx="523873" cy="0"/>
-            </a:xfrm>
-            <a:custGeom>
-              <a:avLst/>
-              <a:pathLst>
-                <a:path w="523873" h="0">
-                  <a:moveTo>
-                    <a:pt x="0" y="0"/>
-                  </a:moveTo>
-                  <a:lnTo>
-                    <a:pt x="523873" y="0"/>
+              <a:off x="4892105" y="2671464"/>
+              <a:ext cx="525433" cy="0"/>
+            </a:xfrm>
+            <a:custGeom>
+              <a:avLst/>
+              <a:pathLst>
+                <a:path w="525433" h="0">
+                  <a:moveTo>
+                    <a:pt x="0" y="0"/>
+                  </a:moveTo>
+                  <a:lnTo>
+                    <a:pt x="525433" y="0"/>
                   </a:lnTo>
                 </a:path>
               </a:pathLst>
@@ -3490,18 +3490,18 @@
           </p:nvSpPr>
           <p:spPr>
             <a:xfrm>
-              <a:off x="5169171" y="2680081"/>
-              <a:ext cx="0" cy="3046647"/>
-            </a:xfrm>
-            <a:custGeom>
-              <a:avLst/>
-              <a:pathLst>
-                <a:path w="0" h="3046647">
-                  <a:moveTo>
-                    <a:pt x="0" y="0"/>
-                  </a:moveTo>
-                  <a:lnTo>
-                    <a:pt x="0" y="3046647"/>
+              <a:off x="5154822" y="2671464"/>
+              <a:ext cx="0" cy="3061590"/>
+            </a:xfrm>
+            <a:custGeom>
+              <a:avLst/>
+              <a:pathLst>
+                <a:path w="0" h="3061590">
+                  <a:moveTo>
+                    <a:pt x="0" y="0"/>
+                  </a:moveTo>
+                  <a:lnTo>
+                    <a:pt x="0" y="3061590"/>
                   </a:lnTo>
                 </a:path>
               </a:pathLst>
@@ -3530,18 +3530,18 @@
           </p:nvSpPr>
           <p:spPr>
             <a:xfrm>
-              <a:off x="4907234" y="5726728"/>
-              <a:ext cx="523873" cy="0"/>
-            </a:xfrm>
-            <a:custGeom>
-              <a:avLst/>
-              <a:pathLst>
-                <a:path w="523873" h="0">
-                  <a:moveTo>
-                    <a:pt x="0" y="0"/>
-                  </a:moveTo>
-                  <a:lnTo>
-                    <a:pt x="523873" y="0"/>
+              <a:off x="4892105" y="5733054"/>
+              <a:ext cx="525433" cy="0"/>
+            </a:xfrm>
+            <a:custGeom>
+              <a:avLst/>
+              <a:pathLst>
+                <a:path w="525433" h="0">
+                  <a:moveTo>
+                    <a:pt x="0" y="0"/>
+                  </a:moveTo>
+                  <a:lnTo>
+                    <a:pt x="525433" y="0"/>
                   </a:lnTo>
                 </a:path>
               </a:pathLst>
@@ -3570,18 +3570,18 @@
           </p:nvSpPr>
           <p:spPr>
             <a:xfrm>
-              <a:off x="5954982" y="2228020"/>
-              <a:ext cx="523873" cy="0"/>
-            </a:xfrm>
-            <a:custGeom>
-              <a:avLst/>
-              <a:pathLst>
-                <a:path w="523873" h="0">
-                  <a:moveTo>
-                    <a:pt x="0" y="0"/>
-                  </a:moveTo>
-                  <a:lnTo>
-                    <a:pt x="523873" y="0"/>
+              <a:off x="5942972" y="2217186"/>
+              <a:ext cx="525433" cy="0"/>
+            </a:xfrm>
+            <a:custGeom>
+              <a:avLst/>
+              <a:pathLst>
+                <a:path w="525433" h="0">
+                  <a:moveTo>
+                    <a:pt x="0" y="0"/>
+                  </a:moveTo>
+                  <a:lnTo>
+                    <a:pt x="525433" y="0"/>
                   </a:lnTo>
                 </a:path>
               </a:pathLst>
@@ -3610,18 +3610,18 @@
           </p:nvSpPr>
           <p:spPr>
             <a:xfrm>
-              <a:off x="6216919" y="2228020"/>
-              <a:ext cx="0" cy="4343689"/>
-            </a:xfrm>
-            <a:custGeom>
-              <a:avLst/>
-              <a:pathLst>
-                <a:path w="0" h="4343689">
-                  <a:moveTo>
-                    <a:pt x="0" y="0"/>
-                  </a:moveTo>
-                  <a:lnTo>
-                    <a:pt x="0" y="4343689"/>
+              <a:off x="6205689" y="2217186"/>
+              <a:ext cx="0" cy="4364994"/>
+            </a:xfrm>
+            <a:custGeom>
+              <a:avLst/>
+              <a:pathLst>
+                <a:path w="0" h="4364994">
+                  <a:moveTo>
+                    <a:pt x="0" y="0"/>
+                  </a:moveTo>
+                  <a:lnTo>
+                    <a:pt x="0" y="4364994"/>
                   </a:lnTo>
                 </a:path>
               </a:pathLst>
@@ -3650,18 +3650,18 @@
           </p:nvSpPr>
           <p:spPr>
             <a:xfrm>
-              <a:off x="5954982" y="6571710"/>
-              <a:ext cx="523873" cy="0"/>
-            </a:xfrm>
-            <a:custGeom>
-              <a:avLst/>
-              <a:pathLst>
-                <a:path w="523873" h="0">
-                  <a:moveTo>
-                    <a:pt x="0" y="0"/>
-                  </a:moveTo>
-                  <a:lnTo>
-                    <a:pt x="523873" y="0"/>
+              <a:off x="5942972" y="6582181"/>
+              <a:ext cx="525433" cy="0"/>
+            </a:xfrm>
+            <a:custGeom>
+              <a:avLst/>
+              <a:pathLst>
+                <a:path w="525433" h="0">
+                  <a:moveTo>
+                    <a:pt x="0" y="0"/>
+                  </a:moveTo>
+                  <a:lnTo>
+                    <a:pt x="525433" y="0"/>
                   </a:lnTo>
                 </a:path>
               </a:pathLst>
@@ -3690,18 +3690,18 @@
           </p:nvSpPr>
           <p:spPr>
             <a:xfrm>
-              <a:off x="7002730" y="2464074"/>
-              <a:ext cx="523873" cy="0"/>
-            </a:xfrm>
-            <a:custGeom>
-              <a:avLst/>
-              <a:pathLst>
-                <a:path w="523873" h="0">
-                  <a:moveTo>
-                    <a:pt x="0" y="0"/>
-                  </a:moveTo>
-                  <a:lnTo>
-                    <a:pt x="523873" y="0"/>
+              <a:off x="6993839" y="2454398"/>
+              <a:ext cx="525433" cy="0"/>
+            </a:xfrm>
+            <a:custGeom>
+              <a:avLst/>
+              <a:pathLst>
+                <a:path w="525433" h="0">
+                  <a:moveTo>
+                    <a:pt x="0" y="0"/>
+                  </a:moveTo>
+                  <a:lnTo>
+                    <a:pt x="525433" y="0"/>
                   </a:lnTo>
                 </a:path>
               </a:pathLst>
@@ -3730,18 +3730,18 @@
           </p:nvSpPr>
           <p:spPr>
             <a:xfrm>
-              <a:off x="7264667" y="2464074"/>
-              <a:ext cx="0" cy="2004702"/>
-            </a:xfrm>
-            <a:custGeom>
-              <a:avLst/>
-              <a:pathLst>
-                <a:path w="0" h="2004702">
-                  <a:moveTo>
-                    <a:pt x="0" y="0"/>
-                  </a:moveTo>
-                  <a:lnTo>
-                    <a:pt x="0" y="2004702"/>
+              <a:off x="7256556" y="2454398"/>
+              <a:ext cx="0" cy="2014535"/>
+            </a:xfrm>
+            <a:custGeom>
+              <a:avLst/>
+              <a:pathLst>
+                <a:path w="0" h="2014535">
+                  <a:moveTo>
+                    <a:pt x="0" y="0"/>
+                  </a:moveTo>
+                  <a:lnTo>
+                    <a:pt x="0" y="2014535"/>
                   </a:lnTo>
                 </a:path>
               </a:pathLst>
@@ -3770,18 +3770,18 @@
           </p:nvSpPr>
           <p:spPr>
             <a:xfrm>
-              <a:off x="7002730" y="4468777"/>
-              <a:ext cx="523873" cy="0"/>
-            </a:xfrm>
-            <a:custGeom>
-              <a:avLst/>
-              <a:pathLst>
-                <a:path w="523873" h="0">
-                  <a:moveTo>
-                    <a:pt x="0" y="0"/>
-                  </a:moveTo>
-                  <a:lnTo>
-                    <a:pt x="523873" y="0"/>
+              <a:off x="6993839" y="4468933"/>
+              <a:ext cx="525433" cy="0"/>
+            </a:xfrm>
+            <a:custGeom>
+              <a:avLst/>
+              <a:pathLst>
+                <a:path w="525433" h="0">
+                  <a:moveTo>
+                    <a:pt x="0" y="0"/>
+                  </a:moveTo>
+                  <a:lnTo>
+                    <a:pt x="525433" y="0"/>
                   </a:lnTo>
                 </a:path>
               </a:pathLst>
@@ -3810,18 +3810,18 @@
           </p:nvSpPr>
           <p:spPr>
             <a:xfrm>
-              <a:off x="8050477" y="1658184"/>
-              <a:ext cx="523873" cy="0"/>
-            </a:xfrm>
-            <a:custGeom>
-              <a:avLst/>
-              <a:pathLst>
-                <a:path w="523873" h="0">
-                  <a:moveTo>
-                    <a:pt x="0" y="0"/>
-                  </a:moveTo>
-                  <a:lnTo>
-                    <a:pt x="523873" y="0"/>
+              <a:off x="8044706" y="1644555"/>
+              <a:ext cx="525433" cy="0"/>
+            </a:xfrm>
+            <a:custGeom>
+              <a:avLst/>
+              <a:pathLst>
+                <a:path w="525433" h="0">
+                  <a:moveTo>
+                    <a:pt x="0" y="0"/>
+                  </a:moveTo>
+                  <a:lnTo>
+                    <a:pt x="525433" y="0"/>
                   </a:lnTo>
                 </a:path>
               </a:pathLst>
@@ -3850,18 +3850,18 @@
           </p:nvSpPr>
           <p:spPr>
             <a:xfrm>
-              <a:off x="8312414" y="1658184"/>
-              <a:ext cx="0" cy="1052468"/>
-            </a:xfrm>
-            <a:custGeom>
-              <a:avLst/>
-              <a:pathLst>
-                <a:path w="0" h="1052468">
-                  <a:moveTo>
-                    <a:pt x="0" y="0"/>
-                  </a:moveTo>
-                  <a:lnTo>
-                    <a:pt x="0" y="1052468"/>
+              <a:off x="8307423" y="1644555"/>
+              <a:ext cx="0" cy="1057631"/>
+            </a:xfrm>
+            <a:custGeom>
+              <a:avLst/>
+              <a:pathLst>
+                <a:path w="0" h="1057631">
+                  <a:moveTo>
+                    <a:pt x="0" y="0"/>
+                  </a:moveTo>
+                  <a:lnTo>
+                    <a:pt x="0" y="1057631"/>
                   </a:lnTo>
                 </a:path>
               </a:pathLst>
@@ -3890,18 +3890,18 @@
           </p:nvSpPr>
           <p:spPr>
             <a:xfrm>
-              <a:off x="8050477" y="2710653"/>
-              <a:ext cx="523873" cy="0"/>
-            </a:xfrm>
-            <a:custGeom>
-              <a:avLst/>
-              <a:pathLst>
-                <a:path w="523873" h="0">
-                  <a:moveTo>
-                    <a:pt x="0" y="0"/>
-                  </a:moveTo>
-                  <a:lnTo>
-                    <a:pt x="523873" y="0"/>
+              <a:off x="8044706" y="2702186"/>
+              <a:ext cx="525433" cy="0"/>
+            </a:xfrm>
+            <a:custGeom>
+              <a:avLst/>
+              <a:pathLst>
+                <a:path w="525433" h="0">
+                  <a:moveTo>
+                    <a:pt x="0" y="0"/>
+                  </a:moveTo>
+                  <a:lnTo>
+                    <a:pt x="525433" y="0"/>
                   </a:lnTo>
                 </a:path>
               </a:pathLst>
@@ -3930,18 +3930,18 @@
           </p:nvSpPr>
           <p:spPr>
             <a:xfrm>
-              <a:off x="9098225" y="1668207"/>
-              <a:ext cx="523873" cy="0"/>
-            </a:xfrm>
-            <a:custGeom>
-              <a:avLst/>
-              <a:pathLst>
-                <a:path w="523873" h="0">
-                  <a:moveTo>
-                    <a:pt x="0" y="0"/>
-                  </a:moveTo>
-                  <a:lnTo>
-                    <a:pt x="523873" y="0"/>
+              <a:off x="9095573" y="1654627"/>
+              <a:ext cx="525433" cy="0"/>
+            </a:xfrm>
+            <a:custGeom>
+              <a:avLst/>
+              <a:pathLst>
+                <a:path w="525433" h="0">
+                  <a:moveTo>
+                    <a:pt x="0" y="0"/>
+                  </a:moveTo>
+                  <a:lnTo>
+                    <a:pt x="525433" y="0"/>
                   </a:lnTo>
                 </a:path>
               </a:pathLst>
@@ -3970,18 +3970,18 @@
           </p:nvSpPr>
           <p:spPr>
             <a:xfrm>
-              <a:off x="9360162" y="1668207"/>
-              <a:ext cx="0" cy="2004702"/>
-            </a:xfrm>
-            <a:custGeom>
-              <a:avLst/>
-              <a:pathLst>
-                <a:path w="0" h="2004702">
-                  <a:moveTo>
-                    <a:pt x="0" y="0"/>
-                  </a:moveTo>
-                  <a:lnTo>
-                    <a:pt x="0" y="2004702"/>
+              <a:off x="9358290" y="1654627"/>
+              <a:ext cx="0" cy="2014535"/>
+            </a:xfrm>
+            <a:custGeom>
+              <a:avLst/>
+              <a:pathLst>
+                <a:path w="0" h="2014535">
+                  <a:moveTo>
+                    <a:pt x="0" y="0"/>
+                  </a:moveTo>
+                  <a:lnTo>
+                    <a:pt x="0" y="2014535"/>
                   </a:lnTo>
                 </a:path>
               </a:pathLst>
@@ -4010,18 +4010,18 @@
           </p:nvSpPr>
           <p:spPr>
             <a:xfrm>
-              <a:off x="9098225" y="3672910"/>
-              <a:ext cx="523873" cy="0"/>
-            </a:xfrm>
-            <a:custGeom>
-              <a:avLst/>
-              <a:pathLst>
-                <a:path w="523873" h="0">
-                  <a:moveTo>
-                    <a:pt x="0" y="0"/>
-                  </a:moveTo>
-                  <a:lnTo>
-                    <a:pt x="523873" y="0"/>
+              <a:off x="9095573" y="3669163"/>
+              <a:ext cx="525433" cy="0"/>
+            </a:xfrm>
+            <a:custGeom>
+              <a:avLst/>
+              <a:pathLst>
+                <a:path w="525433" h="0">
+                  <a:moveTo>
+                    <a:pt x="0" y="0"/>
+                  </a:moveTo>
+                  <a:lnTo>
+                    <a:pt x="525433" y="0"/>
                   </a:lnTo>
                 </a:path>
               </a:pathLst>
@@ -4050,15 +4050,15 @@
           </p:nvSpPr>
           <p:spPr>
             <a:xfrm>
-              <a:off x="2025928" y="1658184"/>
-              <a:ext cx="0" cy="117901"/>
-            </a:xfrm>
-            <a:custGeom>
-              <a:avLst/>
-              <a:pathLst>
-                <a:path w="0" h="117901">
-                  <a:moveTo>
-                    <a:pt x="0" y="117901"/>
+              <a:off x="2002220" y="1644555"/>
+              <a:ext cx="0" cy="118479"/>
+            </a:xfrm>
+            <a:custGeom>
+              <a:avLst/>
+              <a:pathLst>
+                <a:path w="0" h="118479">
+                  <a:moveTo>
+                    <a:pt x="0" y="118479"/>
                   </a:moveTo>
                   <a:lnTo>
                     <a:pt x="0" y="0"/>
@@ -4090,18 +4090,18 @@
           </p:nvSpPr>
           <p:spPr>
             <a:xfrm>
-              <a:off x="2025928" y="2487755"/>
-              <a:ext cx="0" cy="1016760"/>
-            </a:xfrm>
-            <a:custGeom>
-              <a:avLst/>
-              <a:pathLst>
-                <a:path w="0" h="1016760">
-                  <a:moveTo>
-                    <a:pt x="0" y="0"/>
-                  </a:moveTo>
-                  <a:lnTo>
-                    <a:pt x="0" y="1016760"/>
+              <a:off x="2002220" y="2478195"/>
+              <a:ext cx="0" cy="1021747"/>
+            </a:xfrm>
+            <a:custGeom>
+              <a:avLst/>
+              <a:pathLst>
+                <a:path w="0" h="1021747">
+                  <a:moveTo>
+                    <a:pt x="0" y="0"/>
+                  </a:moveTo>
+                  <a:lnTo>
+                    <a:pt x="0" y="1021747"/>
                   </a:lnTo>
                 </a:path>
               </a:pathLst>
@@ -4130,24 +4130,24 @@
           </p:nvSpPr>
           <p:spPr>
             <a:xfrm>
-              <a:off x="1633023" y="1776085"/>
-              <a:ext cx="785810" cy="711669"/>
-            </a:xfrm>
-            <a:custGeom>
-              <a:avLst/>
-              <a:pathLst>
-                <a:path w="785810" h="711669">
-                  <a:moveTo>
-                    <a:pt x="0" y="0"/>
-                  </a:moveTo>
-                  <a:lnTo>
-                    <a:pt x="0" y="711669"/>
-                  </a:lnTo>
-                  <a:lnTo>
-                    <a:pt x="785810" y="711669"/>
-                  </a:lnTo>
-                  <a:lnTo>
-                    <a:pt x="785810" y="0"/>
+              <a:off x="1608145" y="1763034"/>
+              <a:ext cx="788150" cy="715160"/>
+            </a:xfrm>
+            <a:custGeom>
+              <a:avLst/>
+              <a:pathLst>
+                <a:path w="788150" h="715160">
+                  <a:moveTo>
+                    <a:pt x="0" y="0"/>
+                  </a:moveTo>
+                  <a:lnTo>
+                    <a:pt x="0" y="715160"/>
+                  </a:lnTo>
+                  <a:lnTo>
+                    <a:pt x="788150" y="715160"/>
+                  </a:lnTo>
+                  <a:lnTo>
+                    <a:pt x="788150" y="0"/>
                   </a:lnTo>
                   <a:close/>
                 </a:path>
@@ -4182,18 +4182,18 @@
           </p:nvSpPr>
           <p:spPr>
             <a:xfrm>
-              <a:off x="1633023" y="1953627"/>
-              <a:ext cx="785810" cy="0"/>
-            </a:xfrm>
-            <a:custGeom>
-              <a:avLst/>
-              <a:pathLst>
-                <a:path w="785810" h="0">
-                  <a:moveTo>
-                    <a:pt x="0" y="0"/>
-                  </a:moveTo>
-                  <a:lnTo>
-                    <a:pt x="785810" y="0"/>
+              <a:off x="1608145" y="1941447"/>
+              <a:ext cx="788150" cy="0"/>
+            </a:xfrm>
+            <a:custGeom>
+              <a:avLst/>
+              <a:pathLst>
+                <a:path w="788150" h="0">
+                  <a:moveTo>
+                    <a:pt x="0" y="0"/>
+                  </a:moveTo>
+                  <a:lnTo>
+                    <a:pt x="788150" y="0"/>
                   </a:lnTo>
                 </a:path>
               </a:pathLst>
@@ -4222,15 +4222,15 @@
           </p:nvSpPr>
           <p:spPr>
             <a:xfrm>
-              <a:off x="3073676" y="1683242"/>
-              <a:ext cx="0" cy="150102"/>
-            </a:xfrm>
-            <a:custGeom>
-              <a:avLst/>
-              <a:pathLst>
-                <a:path w="0" h="150102">
-                  <a:moveTo>
-                    <a:pt x="0" y="150102"/>
+              <a:off x="3053087" y="1669736"/>
+              <a:ext cx="0" cy="150838"/>
+            </a:xfrm>
+            <a:custGeom>
+              <a:avLst/>
+              <a:pathLst>
+                <a:path w="0" h="150838">
+                  <a:moveTo>
+                    <a:pt x="0" y="150838"/>
                   </a:moveTo>
                   <a:lnTo>
                     <a:pt x="0" y="0"/>
@@ -4262,18 +4262,18 @@
           </p:nvSpPr>
           <p:spPr>
             <a:xfrm>
-              <a:off x="3073676" y="2257590"/>
-              <a:ext cx="0" cy="614942"/>
-            </a:xfrm>
-            <a:custGeom>
-              <a:avLst/>
-              <a:pathLst>
-                <a:path w="0" h="614942">
-                  <a:moveTo>
-                    <a:pt x="0" y="0"/>
-                  </a:moveTo>
-                  <a:lnTo>
-                    <a:pt x="0" y="614942"/>
+              <a:off x="3053087" y="2246901"/>
+              <a:ext cx="0" cy="617958"/>
+            </a:xfrm>
+            <a:custGeom>
+              <a:avLst/>
+              <a:pathLst>
+                <a:path w="0" h="617958">
+                  <a:moveTo>
+                    <a:pt x="0" y="0"/>
+                  </a:moveTo>
+                  <a:lnTo>
+                    <a:pt x="0" y="617958"/>
                   </a:lnTo>
                 </a:path>
               </a:pathLst>
@@ -4302,24 +4302,24 @@
           </p:nvSpPr>
           <p:spPr>
             <a:xfrm>
-              <a:off x="2680771" y="1833344"/>
-              <a:ext cx="785810" cy="424245"/>
-            </a:xfrm>
-            <a:custGeom>
-              <a:avLst/>
-              <a:pathLst>
-                <a:path w="785810" h="424245">
-                  <a:moveTo>
-                    <a:pt x="0" y="0"/>
-                  </a:moveTo>
-                  <a:lnTo>
-                    <a:pt x="0" y="424245"/>
-                  </a:lnTo>
-                  <a:lnTo>
-                    <a:pt x="785810" y="424245"/>
-                  </a:lnTo>
-                  <a:lnTo>
-                    <a:pt x="785810" y="0"/>
+              <a:off x="2659012" y="1820575"/>
+              <a:ext cx="788150" cy="426326"/>
+            </a:xfrm>
+            <a:custGeom>
+              <a:avLst/>
+              <a:pathLst>
+                <a:path w="788150" h="426326">
+                  <a:moveTo>
+                    <a:pt x="0" y="0"/>
+                  </a:moveTo>
+                  <a:lnTo>
+                    <a:pt x="0" y="426326"/>
+                  </a:lnTo>
+                  <a:lnTo>
+                    <a:pt x="788150" y="426326"/>
+                  </a:lnTo>
+                  <a:lnTo>
+                    <a:pt x="788150" y="0"/>
                   </a:lnTo>
                   <a:close/>
                 </a:path>
@@ -4354,18 +4354,18 @@
           </p:nvSpPr>
           <p:spPr>
             <a:xfrm>
-              <a:off x="2680771" y="2001489"/>
-              <a:ext cx="785810" cy="0"/>
-            </a:xfrm>
-            <a:custGeom>
-              <a:avLst/>
-              <a:pathLst>
-                <a:path w="785810" h="0">
-                  <a:moveTo>
-                    <a:pt x="0" y="0"/>
-                  </a:moveTo>
-                  <a:lnTo>
-                    <a:pt x="785810" y="0"/>
+              <a:off x="2659012" y="1989544"/>
+              <a:ext cx="788150" cy="0"/>
+            </a:xfrm>
+            <a:custGeom>
+              <a:avLst/>
+              <a:pathLst>
+                <a:path w="788150" h="0">
+                  <a:moveTo>
+                    <a:pt x="0" y="0"/>
+                  </a:moveTo>
+                  <a:lnTo>
+                    <a:pt x="788150" y="0"/>
                   </a:lnTo>
                 </a:path>
               </a:pathLst>
@@ -4394,15 +4394,15 @@
           </p:nvSpPr>
           <p:spPr>
             <a:xfrm>
-              <a:off x="4121424" y="1658184"/>
-              <a:ext cx="0" cy="38590"/>
-            </a:xfrm>
-            <a:custGeom>
-              <a:avLst/>
-              <a:pathLst>
-                <a:path w="0" h="38590">
-                  <a:moveTo>
-                    <a:pt x="0" y="38590"/>
+              <a:off x="4103955" y="1644555"/>
+              <a:ext cx="0" cy="38779"/>
+            </a:xfrm>
+            <a:custGeom>
+              <a:avLst/>
+              <a:pathLst>
+                <a:path w="0" h="38779">
+                  <a:moveTo>
+                    <a:pt x="0" y="38779"/>
                   </a:moveTo>
                   <a:lnTo>
                     <a:pt x="0" y="0"/>
@@ -4434,18 +4434,18 @@
           </p:nvSpPr>
           <p:spPr>
             <a:xfrm>
-              <a:off x="4121424" y="2169007"/>
-              <a:ext cx="0" cy="684480"/>
-            </a:xfrm>
-            <a:custGeom>
-              <a:avLst/>
-              <a:pathLst>
-                <a:path w="0" h="684480">
-                  <a:moveTo>
-                    <a:pt x="0" y="0"/>
-                  </a:moveTo>
-                  <a:lnTo>
-                    <a:pt x="0" y="684480"/>
+              <a:off x="4103955" y="2157883"/>
+              <a:ext cx="0" cy="687837"/>
+            </a:xfrm>
+            <a:custGeom>
+              <a:avLst/>
+              <a:pathLst>
+                <a:path w="0" h="687837">
+                  <a:moveTo>
+                    <a:pt x="0" y="0"/>
+                  </a:moveTo>
+                  <a:lnTo>
+                    <a:pt x="0" y="687837"/>
                   </a:lnTo>
                 </a:path>
               </a:pathLst>
@@ -4474,24 +4474,24 @@
           </p:nvSpPr>
           <p:spPr>
             <a:xfrm>
-              <a:off x="3728518" y="1696774"/>
-              <a:ext cx="785810" cy="472232"/>
-            </a:xfrm>
-            <a:custGeom>
-              <a:avLst/>
-              <a:pathLst>
-                <a:path w="785810" h="472232">
-                  <a:moveTo>
-                    <a:pt x="0" y="0"/>
-                  </a:moveTo>
-                  <a:lnTo>
-                    <a:pt x="0" y="472232"/>
-                  </a:lnTo>
-                  <a:lnTo>
-                    <a:pt x="785810" y="472232"/>
-                  </a:lnTo>
-                  <a:lnTo>
-                    <a:pt x="785810" y="0"/>
+              <a:off x="3709879" y="1683334"/>
+              <a:ext cx="788150" cy="474548"/>
+            </a:xfrm>
+            <a:custGeom>
+              <a:avLst/>
+              <a:pathLst>
+                <a:path w="788150" h="474548">
+                  <a:moveTo>
+                    <a:pt x="0" y="0"/>
+                  </a:moveTo>
+                  <a:lnTo>
+                    <a:pt x="0" y="474548"/>
+                  </a:lnTo>
+                  <a:lnTo>
+                    <a:pt x="788150" y="474548"/>
+                  </a:lnTo>
+                  <a:lnTo>
+                    <a:pt x="788150" y="0"/>
                   </a:lnTo>
                   <a:close/>
                 </a:path>
@@ -4526,18 +4526,18 @@
           </p:nvSpPr>
           <p:spPr>
             <a:xfrm>
-              <a:off x="3728518" y="1831841"/>
-              <a:ext cx="785810" cy="0"/>
-            </a:xfrm>
-            <a:custGeom>
-              <a:avLst/>
-              <a:pathLst>
-                <a:path w="785810" h="0">
-                  <a:moveTo>
-                    <a:pt x="0" y="0"/>
-                  </a:moveTo>
-                  <a:lnTo>
-                    <a:pt x="785810" y="0"/>
+              <a:off x="3709879" y="1819064"/>
+              <a:ext cx="788150" cy="0"/>
+            </a:xfrm>
+            <a:custGeom>
+              <a:avLst/>
+              <a:pathLst>
+                <a:path w="788150" h="0">
+                  <a:moveTo>
+                    <a:pt x="0" y="0"/>
+                  </a:moveTo>
+                  <a:lnTo>
+                    <a:pt x="788150" y="0"/>
                   </a:lnTo>
                 </a:path>
               </a:pathLst>
@@ -4566,15 +4566,15 @@
           </p:nvSpPr>
           <p:spPr>
             <a:xfrm>
-              <a:off x="5169171" y="2680081"/>
-              <a:ext cx="0" cy="1345907"/>
-            </a:xfrm>
-            <a:custGeom>
-              <a:avLst/>
-              <a:pathLst>
-                <a:path w="0" h="1345907">
-                  <a:moveTo>
-                    <a:pt x="0" y="1345907"/>
+              <a:off x="5154822" y="2671464"/>
+              <a:ext cx="0" cy="1352508"/>
+            </a:xfrm>
+            <a:custGeom>
+              <a:avLst/>
+              <a:pathLst>
+                <a:path w="0" h="1352508">
+                  <a:moveTo>
+                    <a:pt x="0" y="1352508"/>
                   </a:moveTo>
                   <a:lnTo>
                     <a:pt x="0" y="0"/>
@@ -4606,18 +4606,18 @@
           </p:nvSpPr>
           <p:spPr>
             <a:xfrm>
-              <a:off x="5169171" y="5485788"/>
-              <a:ext cx="0" cy="240940"/>
-            </a:xfrm>
-            <a:custGeom>
-              <a:avLst/>
-              <a:pathLst>
-                <a:path w="0" h="240940">
-                  <a:moveTo>
-                    <a:pt x="0" y="0"/>
-                  </a:moveTo>
-                  <a:lnTo>
-                    <a:pt x="0" y="240940"/>
+              <a:off x="5154822" y="5490932"/>
+              <a:ext cx="0" cy="242121"/>
+            </a:xfrm>
+            <a:custGeom>
+              <a:avLst/>
+              <a:pathLst>
+                <a:path w="0" h="242121">
+                  <a:moveTo>
+                    <a:pt x="0" y="0"/>
+                  </a:moveTo>
+                  <a:lnTo>
+                    <a:pt x="0" y="242121"/>
                   </a:lnTo>
                 </a:path>
               </a:pathLst>
@@ -4646,24 +4646,24 @@
           </p:nvSpPr>
           <p:spPr>
             <a:xfrm>
-              <a:off x="4776266" y="4025988"/>
-              <a:ext cx="785810" cy="1459799"/>
-            </a:xfrm>
-            <a:custGeom>
-              <a:avLst/>
-              <a:pathLst>
-                <a:path w="785810" h="1459799">
-                  <a:moveTo>
-                    <a:pt x="0" y="0"/>
-                  </a:moveTo>
-                  <a:lnTo>
-                    <a:pt x="0" y="1459799"/>
-                  </a:lnTo>
-                  <a:lnTo>
-                    <a:pt x="785810" y="1459799"/>
-                  </a:lnTo>
-                  <a:lnTo>
-                    <a:pt x="785810" y="0"/>
+              <a:off x="4760746" y="4023973"/>
+              <a:ext cx="788150" cy="1466959"/>
+            </a:xfrm>
+            <a:custGeom>
+              <a:avLst/>
+              <a:pathLst>
+                <a:path w="788150" h="1466959">
+                  <a:moveTo>
+                    <a:pt x="0" y="0"/>
+                  </a:moveTo>
+                  <a:lnTo>
+                    <a:pt x="0" y="1466959"/>
+                  </a:lnTo>
+                  <a:lnTo>
+                    <a:pt x="788150" y="1466959"/>
+                  </a:lnTo>
+                  <a:lnTo>
+                    <a:pt x="788150" y="0"/>
                   </a:lnTo>
                   <a:close/>
                 </a:path>
@@ -4698,18 +4698,18 @@
           </p:nvSpPr>
           <p:spPr>
             <a:xfrm>
-              <a:off x="4776266" y="4694807"/>
-              <a:ext cx="785810" cy="0"/>
-            </a:xfrm>
-            <a:custGeom>
-              <a:avLst/>
-              <a:pathLst>
-                <a:path w="785810" h="0">
-                  <a:moveTo>
-                    <a:pt x="0" y="0"/>
-                  </a:moveTo>
-                  <a:lnTo>
-                    <a:pt x="785810" y="0"/>
+              <a:off x="4760746" y="4696072"/>
+              <a:ext cx="788150" cy="0"/>
+            </a:xfrm>
+            <a:custGeom>
+              <a:avLst/>
+              <a:pathLst>
+                <a:path w="788150" h="0">
+                  <a:moveTo>
+                    <a:pt x="0" y="0"/>
+                  </a:moveTo>
+                  <a:lnTo>
+                    <a:pt x="788150" y="0"/>
                   </a:lnTo>
                 </a:path>
               </a:pathLst>
@@ -4738,15 +4738,15 @@
           </p:nvSpPr>
           <p:spPr>
             <a:xfrm>
-              <a:off x="6216919" y="2228020"/>
-              <a:ext cx="0" cy="1159219"/>
-            </a:xfrm>
-            <a:custGeom>
-              <a:avLst/>
-              <a:pathLst>
-                <a:path w="0" h="1159219">
-                  <a:moveTo>
-                    <a:pt x="0" y="1159219"/>
+              <a:off x="6205689" y="2217186"/>
+              <a:ext cx="0" cy="1164905"/>
+            </a:xfrm>
+            <a:custGeom>
+              <a:avLst/>
+              <a:pathLst>
+                <a:path w="0" h="1164905">
+                  <a:moveTo>
+                    <a:pt x="0" y="1164905"/>
                   </a:moveTo>
                   <a:lnTo>
                     <a:pt x="0" y="0"/>
@@ -4778,18 +4778,18 @@
           </p:nvSpPr>
           <p:spPr>
             <a:xfrm>
-              <a:off x="6216919" y="5608450"/>
-              <a:ext cx="0" cy="963259"/>
-            </a:xfrm>
-            <a:custGeom>
-              <a:avLst/>
-              <a:pathLst>
-                <a:path w="0" h="963259">
-                  <a:moveTo>
-                    <a:pt x="0" y="0"/>
-                  </a:moveTo>
-                  <a:lnTo>
-                    <a:pt x="0" y="963259"/>
+              <a:off x="6205689" y="5614196"/>
+              <a:ext cx="0" cy="967984"/>
+            </a:xfrm>
+            <a:custGeom>
+              <a:avLst/>
+              <a:pathLst>
+                <a:path w="0" h="967984">
+                  <a:moveTo>
+                    <a:pt x="0" y="0"/>
+                  </a:moveTo>
+                  <a:lnTo>
+                    <a:pt x="0" y="967984"/>
                   </a:lnTo>
                 </a:path>
               </a:pathLst>
@@ -4818,24 +4818,24 @@
           </p:nvSpPr>
           <p:spPr>
             <a:xfrm>
-              <a:off x="5824014" y="3387240"/>
-              <a:ext cx="785810" cy="2221210"/>
-            </a:xfrm>
-            <a:custGeom>
-              <a:avLst/>
-              <a:pathLst>
-                <a:path w="785810" h="2221210">
-                  <a:moveTo>
-                    <a:pt x="0" y="0"/>
-                  </a:moveTo>
-                  <a:lnTo>
-                    <a:pt x="0" y="2221210"/>
-                  </a:lnTo>
-                  <a:lnTo>
-                    <a:pt x="785810" y="2221210"/>
-                  </a:lnTo>
-                  <a:lnTo>
-                    <a:pt x="785810" y="0"/>
+              <a:off x="5811614" y="3382091"/>
+              <a:ext cx="788150" cy="2232105"/>
+            </a:xfrm>
+            <a:custGeom>
+              <a:avLst/>
+              <a:pathLst>
+                <a:path w="788150" h="2232105">
+                  <a:moveTo>
+                    <a:pt x="0" y="0"/>
+                  </a:moveTo>
+                  <a:lnTo>
+                    <a:pt x="0" y="2232105"/>
+                  </a:lnTo>
+                  <a:lnTo>
+                    <a:pt x="788150" y="2232105"/>
+                  </a:lnTo>
+                  <a:lnTo>
+                    <a:pt x="788150" y="0"/>
                   </a:lnTo>
                   <a:close/>
                 </a:path>
@@ -4870,18 +4870,18 @@
           </p:nvSpPr>
           <p:spPr>
             <a:xfrm>
-              <a:off x="5824014" y="4820602"/>
-              <a:ext cx="785810" cy="0"/>
-            </a:xfrm>
-            <a:custGeom>
-              <a:avLst/>
-              <a:pathLst>
-                <a:path w="785810" h="0">
-                  <a:moveTo>
-                    <a:pt x="0" y="0"/>
-                  </a:moveTo>
-                  <a:lnTo>
-                    <a:pt x="785810" y="0"/>
+              <a:off x="5811614" y="4822484"/>
+              <a:ext cx="788150" cy="0"/>
+            </a:xfrm>
+            <a:custGeom>
+              <a:avLst/>
+              <a:pathLst>
+                <a:path w="788150" h="0">
+                  <a:moveTo>
+                    <a:pt x="0" y="0"/>
+                  </a:moveTo>
+                  <a:lnTo>
+                    <a:pt x="788150" y="0"/>
                   </a:lnTo>
                 </a:path>
               </a:pathLst>
@@ -4910,15 +4910,15 @@
           </p:nvSpPr>
           <p:spPr>
             <a:xfrm>
-              <a:off x="7264667" y="2464074"/>
-              <a:ext cx="0" cy="191699"/>
-            </a:xfrm>
-            <a:custGeom>
-              <a:avLst/>
-              <a:pathLst>
-                <a:path w="0" h="191699">
-                  <a:moveTo>
-                    <a:pt x="0" y="191699"/>
+              <a:off x="7256556" y="2454398"/>
+              <a:ext cx="0" cy="192639"/>
+            </a:xfrm>
+            <a:custGeom>
+              <a:avLst/>
+              <a:pathLst>
+                <a:path w="0" h="192639">
+                  <a:moveTo>
+                    <a:pt x="0" y="192639"/>
                   </a:moveTo>
                   <a:lnTo>
                     <a:pt x="0" y="0"/>
@@ -4950,18 +4950,18 @@
           </p:nvSpPr>
           <p:spPr>
             <a:xfrm>
-              <a:off x="7264667" y="3648102"/>
-              <a:ext cx="0" cy="820675"/>
-            </a:xfrm>
-            <a:custGeom>
-              <a:avLst/>
-              <a:pathLst>
-                <a:path w="0" h="820675">
-                  <a:moveTo>
-                    <a:pt x="0" y="0"/>
-                  </a:moveTo>
-                  <a:lnTo>
-                    <a:pt x="0" y="820675"/>
+              <a:off x="7256556" y="3644233"/>
+              <a:ext cx="0" cy="824700"/>
+            </a:xfrm>
+            <a:custGeom>
+              <a:avLst/>
+              <a:pathLst>
+                <a:path w="0" h="824700">
+                  <a:moveTo>
+                    <a:pt x="0" y="0"/>
+                  </a:moveTo>
+                  <a:lnTo>
+                    <a:pt x="0" y="824700"/>
                   </a:lnTo>
                 </a:path>
               </a:pathLst>
@@ -4990,24 +4990,24 @@
           </p:nvSpPr>
           <p:spPr>
             <a:xfrm>
-              <a:off x="6871761" y="2655774"/>
-              <a:ext cx="785810" cy="992327"/>
-            </a:xfrm>
-            <a:custGeom>
-              <a:avLst/>
-              <a:pathLst>
-                <a:path w="785810" h="992327">
-                  <a:moveTo>
-                    <a:pt x="0" y="0"/>
-                  </a:moveTo>
-                  <a:lnTo>
-                    <a:pt x="0" y="992327"/>
-                  </a:lnTo>
-                  <a:lnTo>
-                    <a:pt x="785810" y="992327"/>
-                  </a:lnTo>
-                  <a:lnTo>
-                    <a:pt x="785810" y="0"/>
+              <a:off x="6862481" y="2647038"/>
+              <a:ext cx="788150" cy="997194"/>
+            </a:xfrm>
+            <a:custGeom>
+              <a:avLst/>
+              <a:pathLst>
+                <a:path w="788150" h="997194">
+                  <a:moveTo>
+                    <a:pt x="0" y="0"/>
+                  </a:moveTo>
+                  <a:lnTo>
+                    <a:pt x="0" y="997194"/>
+                  </a:lnTo>
+                  <a:lnTo>
+                    <a:pt x="788150" y="997194"/>
+                  </a:lnTo>
+                  <a:lnTo>
+                    <a:pt x="788150" y="0"/>
                   </a:lnTo>
                   <a:close/>
                 </a:path>
@@ -5042,18 +5042,18 @@
           </p:nvSpPr>
           <p:spPr>
             <a:xfrm>
-              <a:off x="6871761" y="3191280"/>
-              <a:ext cx="785810" cy="0"/>
-            </a:xfrm>
-            <a:custGeom>
-              <a:avLst/>
-              <a:pathLst>
-                <a:path w="785810" h="0">
-                  <a:moveTo>
-                    <a:pt x="0" y="0"/>
-                  </a:moveTo>
-                  <a:lnTo>
-                    <a:pt x="785810" y="0"/>
+              <a:off x="6862481" y="3185170"/>
+              <a:ext cx="788150" cy="0"/>
+            </a:xfrm>
+            <a:custGeom>
+              <a:avLst/>
+              <a:pathLst>
+                <a:path w="788150" h="0">
+                  <a:moveTo>
+                    <a:pt x="0" y="0"/>
+                  </a:moveTo>
+                  <a:lnTo>
+                    <a:pt x="788150" y="0"/>
                   </a:lnTo>
                 </a:path>
               </a:pathLst>
@@ -5082,15 +5082,15 @@
           </p:nvSpPr>
           <p:spPr>
             <a:xfrm>
-              <a:off x="8312414" y="1658184"/>
-              <a:ext cx="0" cy="50117"/>
-            </a:xfrm>
-            <a:custGeom>
-              <a:avLst/>
-              <a:pathLst>
-                <a:path w="0" h="50117">
-                  <a:moveTo>
-                    <a:pt x="0" y="50117"/>
+              <a:off x="8307423" y="1644555"/>
+              <a:ext cx="0" cy="50363"/>
+            </a:xfrm>
+            <a:custGeom>
+              <a:avLst/>
+              <a:pathLst>
+                <a:path w="0" h="50363">
+                  <a:moveTo>
+                    <a:pt x="0" y="50363"/>
                   </a:moveTo>
                   <a:lnTo>
                     <a:pt x="0" y="0"/>
@@ -5122,18 +5122,18 @@
           </p:nvSpPr>
           <p:spPr>
             <a:xfrm>
-              <a:off x="8312414" y="2109242"/>
-              <a:ext cx="0" cy="601410"/>
-            </a:xfrm>
-            <a:custGeom>
-              <a:avLst/>
-              <a:pathLst>
-                <a:path w="0" h="601410">
-                  <a:moveTo>
-                    <a:pt x="0" y="0"/>
-                  </a:moveTo>
-                  <a:lnTo>
-                    <a:pt x="0" y="601410"/>
+              <a:off x="8307423" y="2097825"/>
+              <a:ext cx="0" cy="604360"/>
+            </a:xfrm>
+            <a:custGeom>
+              <a:avLst/>
+              <a:pathLst>
+                <a:path w="0" h="604360">
+                  <a:moveTo>
+                    <a:pt x="0" y="0"/>
+                  </a:moveTo>
+                  <a:lnTo>
+                    <a:pt x="0" y="604360"/>
                   </a:lnTo>
                 </a:path>
               </a:pathLst>
@@ -5162,24 +5162,24 @@
           </p:nvSpPr>
           <p:spPr>
             <a:xfrm>
-              <a:off x="7919509" y="1708301"/>
-              <a:ext cx="785810" cy="400940"/>
-            </a:xfrm>
-            <a:custGeom>
-              <a:avLst/>
-              <a:pathLst>
-                <a:path w="785810" h="400940">
-                  <a:moveTo>
-                    <a:pt x="0" y="0"/>
-                  </a:moveTo>
-                  <a:lnTo>
-                    <a:pt x="0" y="400940"/>
-                  </a:lnTo>
-                  <a:lnTo>
-                    <a:pt x="785810" y="400940"/>
-                  </a:lnTo>
-                  <a:lnTo>
-                    <a:pt x="785810" y="0"/>
+              <a:off x="7913348" y="1694918"/>
+              <a:ext cx="788150" cy="402907"/>
+            </a:xfrm>
+            <a:custGeom>
+              <a:avLst/>
+              <a:pathLst>
+                <a:path w="788150" h="402907">
+                  <a:moveTo>
+                    <a:pt x="0" y="0"/>
+                  </a:moveTo>
+                  <a:lnTo>
+                    <a:pt x="0" y="402907"/>
+                  </a:lnTo>
+                  <a:lnTo>
+                    <a:pt x="788150" y="402907"/>
+                  </a:lnTo>
+                  <a:lnTo>
+                    <a:pt x="788150" y="0"/>
                   </a:lnTo>
                   <a:close/>
                 </a:path>
@@ -5214,18 +5214,18 @@
           </p:nvSpPr>
           <p:spPr>
             <a:xfrm>
-              <a:off x="7919509" y="1908771"/>
-              <a:ext cx="785810" cy="0"/>
-            </a:xfrm>
-            <a:custGeom>
-              <a:avLst/>
-              <a:pathLst>
-                <a:path w="785810" h="0">
-                  <a:moveTo>
-                    <a:pt x="0" y="0"/>
-                  </a:moveTo>
-                  <a:lnTo>
-                    <a:pt x="785810" y="0"/>
+              <a:off x="7913348" y="1896372"/>
+              <a:ext cx="788150" cy="0"/>
+            </a:xfrm>
+            <a:custGeom>
+              <a:avLst/>
+              <a:pathLst>
+                <a:path w="788150" h="0">
+                  <a:moveTo>
+                    <a:pt x="0" y="0"/>
+                  </a:moveTo>
+                  <a:lnTo>
+                    <a:pt x="788150" y="0"/>
                   </a:lnTo>
                 </a:path>
               </a:pathLst>
@@ -5254,15 +5254,15 @@
           </p:nvSpPr>
           <p:spPr>
             <a:xfrm>
-              <a:off x="9360162" y="1668207"/>
-              <a:ext cx="0" cy="190446"/>
-            </a:xfrm>
-            <a:custGeom>
-              <a:avLst/>
-              <a:pathLst>
-                <a:path w="0" h="190446">
-                  <a:moveTo>
-                    <a:pt x="0" y="190446"/>
+              <a:off x="9358290" y="1654627"/>
+              <a:ext cx="0" cy="191380"/>
+            </a:xfrm>
+            <a:custGeom>
+              <a:avLst/>
+              <a:pathLst>
+                <a:path w="0" h="191380">
+                  <a:moveTo>
+                    <a:pt x="0" y="191380"/>
                   </a:moveTo>
                   <a:lnTo>
                     <a:pt x="0" y="0"/>
@@ -5294,18 +5294,18 @@
           </p:nvSpPr>
           <p:spPr>
             <a:xfrm>
-              <a:off x="9360162" y="2600394"/>
-              <a:ext cx="0" cy="1072515"/>
-            </a:xfrm>
-            <a:custGeom>
-              <a:avLst/>
-              <a:pathLst>
-                <a:path w="0" h="1072515">
-                  <a:moveTo>
-                    <a:pt x="0" y="0"/>
-                  </a:moveTo>
-                  <a:lnTo>
-                    <a:pt x="0" y="1072515"/>
+              <a:off x="9358290" y="2591386"/>
+              <a:ext cx="0" cy="1077776"/>
+            </a:xfrm>
+            <a:custGeom>
+              <a:avLst/>
+              <a:pathLst>
+                <a:path w="0" h="1077776">
+                  <a:moveTo>
+                    <a:pt x="0" y="0"/>
+                  </a:moveTo>
+                  <a:lnTo>
+                    <a:pt x="0" y="1077776"/>
                   </a:lnTo>
                 </a:path>
               </a:pathLst>
@@ -5334,24 +5334,24 @@
           </p:nvSpPr>
           <p:spPr>
             <a:xfrm>
-              <a:off x="8967257" y="1858654"/>
-              <a:ext cx="785810" cy="741740"/>
-            </a:xfrm>
-            <a:custGeom>
-              <a:avLst/>
-              <a:pathLst>
-                <a:path w="785810" h="741740">
-                  <a:moveTo>
-                    <a:pt x="0" y="0"/>
-                  </a:moveTo>
-                  <a:lnTo>
-                    <a:pt x="0" y="741740"/>
-                  </a:lnTo>
-                  <a:lnTo>
-                    <a:pt x="785810" y="741740"/>
-                  </a:lnTo>
-                  <a:lnTo>
-                    <a:pt x="785810" y="0"/>
+              <a:off x="8964215" y="1846008"/>
+              <a:ext cx="788150" cy="745378"/>
+            </a:xfrm>
+            <a:custGeom>
+              <a:avLst/>
+              <a:pathLst>
+                <a:path w="788150" h="745378">
+                  <a:moveTo>
+                    <a:pt x="0" y="0"/>
+                  </a:moveTo>
+                  <a:lnTo>
+                    <a:pt x="0" y="745378"/>
+                  </a:lnTo>
+                  <a:lnTo>
+                    <a:pt x="788150" y="745378"/>
+                  </a:lnTo>
+                  <a:lnTo>
+                    <a:pt x="788150" y="0"/>
                   </a:lnTo>
                   <a:close/>
                 </a:path>
@@ -5386,18 +5386,18 @@
           </p:nvSpPr>
           <p:spPr>
             <a:xfrm>
-              <a:off x="8967257" y="2124277"/>
-              <a:ext cx="785810" cy="0"/>
-            </a:xfrm>
-            <a:custGeom>
-              <a:avLst/>
-              <a:pathLst>
-                <a:path w="785810" h="0">
-                  <a:moveTo>
-                    <a:pt x="0" y="0"/>
-                  </a:moveTo>
-                  <a:lnTo>
-                    <a:pt x="785810" y="0"/>
+              <a:off x="8964215" y="2112934"/>
+              <a:ext cx="788150" cy="0"/>
+            </a:xfrm>
+            <a:custGeom>
+              <a:avLst/>
+              <a:pathLst>
+                <a:path w="788150" h="0">
+                  <a:moveTo>
+                    <a:pt x="0" y="0"/>
+                  </a:moveTo>
+                  <a:lnTo>
+                    <a:pt x="788150" y="0"/>
                   </a:lnTo>
                 </a:path>
               </a:pathLst>
@@ -5426,8 +5426,8 @@
           </p:nvSpPr>
           <p:spPr>
             <a:xfrm>
-              <a:off x="1397280" y="1407846"/>
-              <a:ext cx="8591530" cy="5507419"/>
+              <a:off x="1371700" y="1392990"/>
+              <a:ext cx="8617110" cy="5534432"/>
             </a:xfrm>
             <a:prstGeom prst="rect">
               <a:avLst/>
@@ -5456,8 +5456,8 @@
           </p:nvSpPr>
           <p:spPr>
             <a:xfrm>
-              <a:off x="1272494" y="6628249"/>
-              <a:ext cx="62155" cy="81691"/>
+              <a:off x="1253190" y="6641057"/>
+              <a:ext cx="55880" cy="76835"/>
             </a:xfrm>
             <a:prstGeom prst="rect">
               <a:avLst/>
@@ -5486,8 +5486,8 @@
                       <a:alpha val="100000"/>
                     </a:srgbClr>
                   </a:solidFill>
-                  <a:latin typeface="Arial"/>
-                  <a:cs typeface="Arial"/>
+                  <a:latin typeface="Times New Roman"/>
+                  <a:cs typeface="Times New Roman"/>
                 </a:rPr>
                 <a:t>0</a:t>
               </a:r>
@@ -5502,8 +5502,8 @@
           </p:nvSpPr>
           <p:spPr>
             <a:xfrm>
-              <a:off x="1210339" y="5375310"/>
-              <a:ext cx="124311" cy="81691"/>
+              <a:off x="1197310" y="5381972"/>
+              <a:ext cx="111760" cy="76835"/>
             </a:xfrm>
             <a:prstGeom prst="rect">
               <a:avLst/>
@@ -5532,8 +5532,8 @@
                       <a:alpha val="100000"/>
                     </a:srgbClr>
                   </a:solidFill>
-                  <a:latin typeface="Arial"/>
-                  <a:cs typeface="Arial"/>
+                  <a:latin typeface="Times New Roman"/>
+                  <a:cs typeface="Times New Roman"/>
                 </a:rPr>
                 <a:t>25</a:t>
               </a:r>
@@ -5548,8 +5548,8 @@
           </p:nvSpPr>
           <p:spPr>
             <a:xfrm>
-              <a:off x="1210339" y="4122370"/>
-              <a:ext cx="124311" cy="81691"/>
+              <a:off x="1197310" y="4122887"/>
+              <a:ext cx="111760" cy="76835"/>
             </a:xfrm>
             <a:prstGeom prst="rect">
               <a:avLst/>
@@ -5578,8 +5578,8 @@
                       <a:alpha val="100000"/>
                     </a:srgbClr>
                   </a:solidFill>
-                  <a:latin typeface="Arial"/>
-                  <a:cs typeface="Arial"/>
+                  <a:latin typeface="Times New Roman"/>
+                  <a:cs typeface="Times New Roman"/>
                 </a:rPr>
                 <a:t>50</a:t>
               </a:r>
@@ -5594,8 +5594,8 @@
           </p:nvSpPr>
           <p:spPr>
             <a:xfrm>
-              <a:off x="1210339" y="2870795"/>
-              <a:ext cx="124311" cy="80327"/>
+              <a:off x="1197310" y="2865113"/>
+              <a:ext cx="111760" cy="75525"/>
             </a:xfrm>
             <a:prstGeom prst="rect">
               <a:avLst/>
@@ -5624,8 +5624,8 @@
                       <a:alpha val="100000"/>
                     </a:srgbClr>
                   </a:solidFill>
-                  <a:latin typeface="Arial"/>
-                  <a:cs typeface="Arial"/>
+                  <a:latin typeface="Times New Roman"/>
+                  <a:cs typeface="Times New Roman"/>
                 </a:rPr>
                 <a:t>75</a:t>
               </a:r>
@@ -5640,8 +5640,8 @@
           </p:nvSpPr>
           <p:spPr>
             <a:xfrm>
-              <a:off x="1148183" y="1616492"/>
-              <a:ext cx="186466" cy="81691"/>
+              <a:off x="1141430" y="1604718"/>
+              <a:ext cx="167640" cy="76835"/>
             </a:xfrm>
             <a:prstGeom prst="rect">
               <a:avLst/>
@@ -5670,8 +5670,8 @@
                       <a:alpha val="100000"/>
                     </a:srgbClr>
                   </a:solidFill>
-                  <a:latin typeface="Arial"/>
-                  <a:cs typeface="Arial"/>
+                  <a:latin typeface="Times New Roman"/>
+                  <a:cs typeface="Times New Roman"/>
                 </a:rPr>
                 <a:t>100</a:t>
               </a:r>
@@ -5686,7 +5686,7 @@
           </p:nvSpPr>
           <p:spPr>
             <a:xfrm>
-              <a:off x="1362485" y="6669941"/>
+              <a:off x="1336905" y="6680893"/>
               <a:ext cx="34794" cy="0"/>
             </a:xfrm>
             <a:custGeom>
@@ -5726,7 +5726,7 @@
           </p:nvSpPr>
           <p:spPr>
             <a:xfrm>
-              <a:off x="1362485" y="5417001"/>
+              <a:off x="1336905" y="5421808"/>
               <a:ext cx="34794" cy="0"/>
             </a:xfrm>
             <a:custGeom>
@@ -5766,7 +5766,7 @@
           </p:nvSpPr>
           <p:spPr>
             <a:xfrm>
-              <a:off x="1362485" y="4164062"/>
+              <a:off x="1336905" y="4162724"/>
               <a:ext cx="34794" cy="0"/>
             </a:xfrm>
             <a:custGeom>
@@ -5806,7 +5806,7 @@
           </p:nvSpPr>
           <p:spPr>
             <a:xfrm>
-              <a:off x="1362485" y="2911123"/>
+              <a:off x="1336905" y="2903639"/>
               <a:ext cx="34794" cy="0"/>
             </a:xfrm>
             <a:custGeom>
@@ -5846,7 +5846,7 @@
           </p:nvSpPr>
           <p:spPr>
             <a:xfrm>
-              <a:off x="1362485" y="1658184"/>
+              <a:off x="1336905" y="1644555"/>
               <a:ext cx="34794" cy="0"/>
             </a:xfrm>
             <a:custGeom>
@@ -5886,7 +5886,7 @@
           </p:nvSpPr>
           <p:spPr>
             <a:xfrm>
-              <a:off x="2025928" y="6915266"/>
+              <a:off x="2002220" y="6927422"/>
               <a:ext cx="0" cy="34794"/>
             </a:xfrm>
             <a:custGeom>
@@ -5926,7 +5926,7 @@
           </p:nvSpPr>
           <p:spPr>
             <a:xfrm>
-              <a:off x="3073676" y="6915266"/>
+              <a:off x="3053087" y="6927422"/>
               <a:ext cx="0" cy="34794"/>
             </a:xfrm>
             <a:custGeom>
@@ -5966,7 +5966,7 @@
           </p:nvSpPr>
           <p:spPr>
             <a:xfrm>
-              <a:off x="4121424" y="6915266"/>
+              <a:off x="4103955" y="6927422"/>
               <a:ext cx="0" cy="34794"/>
             </a:xfrm>
             <a:custGeom>
@@ -6006,7 +6006,7 @@
           </p:nvSpPr>
           <p:spPr>
             <a:xfrm>
-              <a:off x="5169171" y="6915266"/>
+              <a:off x="5154822" y="6927422"/>
               <a:ext cx="0" cy="34794"/>
             </a:xfrm>
             <a:custGeom>
@@ -6046,7 +6046,7 @@
           </p:nvSpPr>
           <p:spPr>
             <a:xfrm>
-              <a:off x="6216919" y="6915266"/>
+              <a:off x="6205689" y="6927422"/>
               <a:ext cx="0" cy="34794"/>
             </a:xfrm>
             <a:custGeom>
@@ -6086,7 +6086,7 @@
           </p:nvSpPr>
           <p:spPr>
             <a:xfrm>
-              <a:off x="7264667" y="6915266"/>
+              <a:off x="7256556" y="6927422"/>
               <a:ext cx="0" cy="34794"/>
             </a:xfrm>
             <a:custGeom>
@@ -6126,7 +6126,7 @@
           </p:nvSpPr>
           <p:spPr>
             <a:xfrm>
-              <a:off x="8312414" y="6915266"/>
+              <a:off x="8307423" y="6927422"/>
               <a:ext cx="0" cy="34794"/>
             </a:xfrm>
             <a:custGeom>
@@ -6166,7 +6166,7 @@
           </p:nvSpPr>
           <p:spPr>
             <a:xfrm>
-              <a:off x="9360162" y="6915266"/>
+              <a:off x="9358290" y="6927422"/>
               <a:ext cx="0" cy="34794"/>
             </a:xfrm>
             <a:custGeom>
@@ -6206,8 +6206,8 @@
           </p:nvSpPr>
           <p:spPr>
             <a:xfrm>
-              <a:off x="1796051" y="6976587"/>
-              <a:ext cx="459754" cy="81309"/>
+              <a:off x="1785003" y="6984922"/>
+              <a:ext cx="434434" cy="79126"/>
             </a:xfrm>
             <a:prstGeom prst="rect">
               <a:avLst/>
@@ -6236,8 +6236,8 @@
                       <a:alpha val="100000"/>
                     </a:srgbClr>
                   </a:solidFill>
-                  <a:latin typeface="Arial"/>
-                  <a:cs typeface="Arial"/>
+                  <a:latin typeface="Times New Roman"/>
+                  <a:cs typeface="Times New Roman"/>
                 </a:rPr>
                 <a:t>Alveolata</a:t>
               </a:r>
@@ -6252,8 +6252,8 @@
           </p:nvSpPr>
           <p:spPr>
             <a:xfrm>
-              <a:off x="2772366" y="6953012"/>
-              <a:ext cx="602619" cy="104884"/>
+              <a:off x="2773715" y="6962330"/>
+              <a:ext cx="558745" cy="101719"/>
             </a:xfrm>
             <a:prstGeom prst="rect">
               <a:avLst/>
@@ -6282,8 +6282,8 @@
                       <a:alpha val="100000"/>
                     </a:srgbClr>
                   </a:solidFill>
-                  <a:latin typeface="Arial"/>
-                  <a:cs typeface="Arial"/>
+                  <a:latin typeface="Times New Roman"/>
+                  <a:cs typeface="Times New Roman"/>
                 </a:rPr>
                 <a:t>Chlorophyta</a:t>
               </a:r>
@@ -6298,8 +6298,8 @@
           </p:nvSpPr>
           <p:spPr>
             <a:xfrm>
-              <a:off x="3919541" y="6976587"/>
-              <a:ext cx="403765" cy="81309"/>
+              <a:off x="3920844" y="6984922"/>
+              <a:ext cx="366221" cy="79126"/>
             </a:xfrm>
             <a:prstGeom prst="rect">
               <a:avLst/>
@@ -6328,8 +6328,8 @@
                       <a:alpha val="100000"/>
                     </a:srgbClr>
                   </a:solidFill>
-                  <a:latin typeface="Arial"/>
-                  <a:cs typeface="Arial"/>
+                  <a:latin typeface="Times New Roman"/>
+                  <a:cs typeface="Times New Roman"/>
                 </a:rPr>
                 <a:t>Discoba</a:t>
               </a:r>
@@ -6344,8 +6344,8 @@
           </p:nvSpPr>
           <p:spPr>
             <a:xfrm>
-              <a:off x="4843005" y="6976587"/>
-              <a:ext cx="652333" cy="81309"/>
+              <a:off x="4863116" y="6984922"/>
+              <a:ext cx="583411" cy="79126"/>
             </a:xfrm>
             <a:prstGeom prst="rect">
               <a:avLst/>
@@ -6374,8 +6374,8 @@
                       <a:alpha val="100000"/>
                     </a:srgbClr>
                   </a:solidFill>
-                  <a:latin typeface="Arial"/>
-                  <a:cs typeface="Arial"/>
+                  <a:latin typeface="Times New Roman"/>
+                  <a:cs typeface="Times New Roman"/>
                 </a:rPr>
                 <a:t>Metamonada</a:t>
               </a:r>
@@ -6390,8 +6390,8 @@
           </p:nvSpPr>
           <p:spPr>
             <a:xfrm>
-              <a:off x="6011953" y="6976587"/>
-              <a:ext cx="409932" cy="81309"/>
+              <a:off x="6016412" y="6985413"/>
+              <a:ext cx="378554" cy="78635"/>
             </a:xfrm>
             <a:prstGeom prst="rect">
               <a:avLst/>
@@ -6420,8 +6420,8 @@
                       <a:alpha val="100000"/>
                     </a:srgbClr>
                   </a:solidFill>
-                  <a:latin typeface="Arial"/>
-                  <a:cs typeface="Arial"/>
+                  <a:latin typeface="Times New Roman"/>
+                  <a:cs typeface="Times New Roman"/>
                 </a:rPr>
                 <a:t>Rhizaria</a:t>
               </a:r>
@@ -6436,8 +6436,8 @@
           </p:nvSpPr>
           <p:spPr>
             <a:xfrm>
-              <a:off x="6963302" y="6954376"/>
-              <a:ext cx="602729" cy="103519"/>
+              <a:off x="6983377" y="6962330"/>
+              <a:ext cx="546357" cy="101719"/>
             </a:xfrm>
             <a:prstGeom prst="rect">
               <a:avLst/>
@@ -6466,8 +6466,8 @@
                       <a:alpha val="100000"/>
                     </a:srgbClr>
                   </a:solidFill>
-                  <a:latin typeface="Arial"/>
-                  <a:cs typeface="Arial"/>
+                  <a:latin typeface="Times New Roman"/>
+                  <a:cs typeface="Times New Roman"/>
                 </a:rPr>
                 <a:t>Rhodophyta</a:t>
               </a:r>
@@ -6482,8 +6482,8 @@
           </p:nvSpPr>
           <p:spPr>
             <a:xfrm>
-              <a:off x="7955224" y="6954322"/>
-              <a:ext cx="714379" cy="103574"/>
+              <a:off x="7987723" y="6962548"/>
+              <a:ext cx="639400" cy="101500"/>
             </a:xfrm>
             <a:prstGeom prst="rect">
               <a:avLst/>
@@ -6512,8 +6512,8 @@
                       <a:alpha val="100000"/>
                     </a:srgbClr>
                   </a:solidFill>
-                  <a:latin typeface="Arial"/>
-                  <a:cs typeface="Arial"/>
+                  <a:latin typeface="Times New Roman"/>
+                  <a:cs typeface="Times New Roman"/>
                 </a:rPr>
                 <a:t>Stramenopiles</a:t>
               </a:r>
@@ -6528,8 +6528,8 @@
           </p:nvSpPr>
           <p:spPr>
             <a:xfrm>
-              <a:off x="9043299" y="6953012"/>
-              <a:ext cx="633725" cy="104884"/>
+              <a:off x="9072724" y="6962330"/>
+              <a:ext cx="571132" cy="101719"/>
             </a:xfrm>
             <a:prstGeom prst="rect">
               <a:avLst/>
@@ -6558,8 +6558,8 @@
                       <a:alpha val="100000"/>
                     </a:srgbClr>
                   </a:solidFill>
-                  <a:latin typeface="Arial"/>
-                  <a:cs typeface="Arial"/>
+                  <a:latin typeface="Times New Roman"/>
+                  <a:cs typeface="Times New Roman"/>
                 </a:rPr>
                 <a:t>Streptophyta</a:t>
               </a:r>
@@ -6574,8 +6574,8 @@
           </p:nvSpPr>
           <p:spPr>
             <a:xfrm>
-              <a:off x="5293113" y="7086743"/>
-              <a:ext cx="799864" cy="129468"/>
+              <a:off x="5321353" y="7090972"/>
+              <a:ext cx="717804" cy="124488"/>
             </a:xfrm>
             <a:prstGeom prst="rect">
               <a:avLst/>
@@ -6604,8 +6604,8 @@
                       <a:alpha val="100000"/>
                     </a:srgbClr>
                   </a:solidFill>
-                  <a:latin typeface="Arial"/>
-                  <a:cs typeface="Arial"/>
+                  <a:latin typeface="Times New Roman"/>
+                  <a:cs typeface="Times New Roman"/>
                 </a:rPr>
                 <a:t>Super Group</a:t>
               </a:r>
@@ -6620,8 +6620,8 @@
           </p:nvSpPr>
           <p:spPr>
             <a:xfrm rot="-5400000">
-              <a:off x="370891" y="4096822"/>
-              <a:ext cx="1296727" cy="129468"/>
+              <a:off x="444663" y="4096768"/>
+              <a:ext cx="1136767" cy="126875"/>
             </a:xfrm>
             <a:prstGeom prst="rect">
               <a:avLst/>
@@ -6650,8 +6650,8 @@
                       <a:alpha val="100000"/>
                     </a:srgbClr>
                   </a:solidFill>
-                  <a:latin typeface="Arial"/>
-                  <a:cs typeface="Arial"/>
+                  <a:latin typeface="Times New Roman"/>
+                  <a:cs typeface="Times New Roman"/>
                 </a:rPr>
                 <a:t>Completeness Score</a:t>
               </a:r>
@@ -6666,8 +6666,8 @@
           </p:nvSpPr>
           <p:spPr>
             <a:xfrm>
-              <a:off x="1397280" y="1177752"/>
-              <a:ext cx="1723876" cy="131105"/>
+              <a:off x="1371700" y="1166102"/>
+              <a:ext cx="1563644" cy="127148"/>
             </a:xfrm>
             <a:prstGeom prst="rect">
               <a:avLst/>
@@ -6696,8 +6696,8 @@
                       <a:alpha val="100000"/>
                     </a:srgbClr>
                   </a:solidFill>
-                  <a:latin typeface="Arial"/>
-                  <a:cs typeface="Arial"/>
+                  <a:latin typeface="Times New Roman"/>
+                  <a:cs typeface="Times New Roman"/>
                 </a:rPr>
                 <a:t>By Associated Super Group</a:t>
               </a:r>
@@ -6712,8 +6712,8 @@
           </p:nvSpPr>
           <p:spPr>
             <a:xfrm>
-              <a:off x="1397280" y="948627"/>
-              <a:ext cx="2441175" cy="155361"/>
+              <a:off x="1371700" y="942733"/>
+              <a:ext cx="2216318" cy="152251"/>
             </a:xfrm>
             <a:prstGeom prst="rect">
               <a:avLst/>
@@ -6742,8 +6742,8 @@
                       <a:alpha val="100000"/>
                     </a:srgbClr>
                   </a:solidFill>
-                  <a:latin typeface="Arial"/>
-                  <a:cs typeface="Arial"/>
+                  <a:latin typeface="Times New Roman"/>
+                  <a:cs typeface="Times New Roman"/>
                 </a:rPr>
                 <a:t>Completeness Score Distribution</a:t>
               </a:r>

</xml_diff>

<commit_message>
Box Plot Updates, Color Updates Main Figures
</commit_message>
<xml_diff>
--- a/Images/Figures_PPT/Box_Plot_C_Score.pptx
+++ b/Images/Figures_PPT/Box_Plot_C_Score.pptx
@@ -2298,8 +2298,8 @@
           </p:nvSpPr>
           <p:spPr>
             <a:xfrm>
-              <a:off x="10058399" y="914400"/>
-              <a:ext cx="0" cy="6400800"/>
+              <a:off x="914400" y="914400"/>
+              <a:ext cx="9144000" cy="6400800"/>
             </a:xfrm>
             <a:prstGeom prst="rect">
               <a:avLst/>
@@ -2333,8 +2333,8 @@
           </p:nvSpPr>
           <p:spPr>
             <a:xfrm>
-              <a:off x="1371700" y="1392990"/>
-              <a:ext cx="8617110" cy="5534432"/>
+              <a:off x="1609207" y="1613754"/>
+              <a:ext cx="8379603" cy="5133042"/>
             </a:xfrm>
             <a:prstGeom prst="rect">
               <a:avLst/>
@@ -2359,21 +2359,21 @@
           </p:nvSpPr>
           <p:spPr>
             <a:xfrm>
-              <a:off x="1371700" y="6051351"/>
-              <a:ext cx="8617110" cy="0"/>
-            </a:xfrm>
-            <a:custGeom>
-              <a:avLst/>
-              <a:pathLst>
-                <a:path w="8617110" h="0">
-                  <a:moveTo>
-                    <a:pt x="0" y="0"/>
-                  </a:moveTo>
-                  <a:lnTo>
-                    <a:pt x="8617110" y="0"/>
-                  </a:lnTo>
-                  <a:lnTo>
-                    <a:pt x="8617110" y="0"/>
+              <a:off x="1609207" y="5934263"/>
+              <a:ext cx="8379603" cy="0"/>
+            </a:xfrm>
+            <a:custGeom>
+              <a:avLst/>
+              <a:pathLst>
+                <a:path w="8379603" h="0">
+                  <a:moveTo>
+                    <a:pt x="0" y="0"/>
+                  </a:moveTo>
+                  <a:lnTo>
+                    <a:pt x="8379603" y="0"/>
+                  </a:lnTo>
+                  <a:lnTo>
+                    <a:pt x="8379603" y="0"/>
                   </a:lnTo>
                 </a:path>
               </a:pathLst>
@@ -2402,21 +2402,21 @@
           </p:nvSpPr>
           <p:spPr>
             <a:xfrm>
-              <a:off x="1371700" y="4792266"/>
-              <a:ext cx="8617110" cy="0"/>
-            </a:xfrm>
-            <a:custGeom>
-              <a:avLst/>
-              <a:pathLst>
-                <a:path w="8617110" h="0">
-                  <a:moveTo>
-                    <a:pt x="0" y="0"/>
-                  </a:moveTo>
-                  <a:lnTo>
-                    <a:pt x="8617110" y="0"/>
-                  </a:lnTo>
-                  <a:lnTo>
-                    <a:pt x="8617110" y="0"/>
+              <a:off x="1609207" y="4766495"/>
+              <a:ext cx="8379603" cy="0"/>
+            </a:xfrm>
+            <a:custGeom>
+              <a:avLst/>
+              <a:pathLst>
+                <a:path w="8379603" h="0">
+                  <a:moveTo>
+                    <a:pt x="0" y="0"/>
+                  </a:moveTo>
+                  <a:lnTo>
+                    <a:pt x="8379603" y="0"/>
+                  </a:lnTo>
+                  <a:lnTo>
+                    <a:pt x="8379603" y="0"/>
                   </a:lnTo>
                 </a:path>
               </a:pathLst>
@@ -2445,21 +2445,21 @@
           </p:nvSpPr>
           <p:spPr>
             <a:xfrm>
-              <a:off x="1371700" y="3533181"/>
-              <a:ext cx="8617110" cy="0"/>
-            </a:xfrm>
-            <a:custGeom>
-              <a:avLst/>
-              <a:pathLst>
-                <a:path w="8617110" h="0">
-                  <a:moveTo>
-                    <a:pt x="0" y="0"/>
-                  </a:moveTo>
-                  <a:lnTo>
-                    <a:pt x="8617110" y="0"/>
-                  </a:lnTo>
-                  <a:lnTo>
-                    <a:pt x="8617110" y="0"/>
+              <a:off x="1609207" y="3598726"/>
+              <a:ext cx="8379603" cy="0"/>
+            </a:xfrm>
+            <a:custGeom>
+              <a:avLst/>
+              <a:pathLst>
+                <a:path w="8379603" h="0">
+                  <a:moveTo>
+                    <a:pt x="0" y="0"/>
+                  </a:moveTo>
+                  <a:lnTo>
+                    <a:pt x="8379603" y="0"/>
+                  </a:lnTo>
+                  <a:lnTo>
+                    <a:pt x="8379603" y="0"/>
                   </a:lnTo>
                 </a:path>
               </a:pathLst>
@@ -2488,21 +2488,21 @@
           </p:nvSpPr>
           <p:spPr>
             <a:xfrm>
-              <a:off x="1371700" y="2274097"/>
-              <a:ext cx="8617110" cy="0"/>
-            </a:xfrm>
-            <a:custGeom>
-              <a:avLst/>
-              <a:pathLst>
-                <a:path w="8617110" h="0">
-                  <a:moveTo>
-                    <a:pt x="0" y="0"/>
-                  </a:moveTo>
-                  <a:lnTo>
-                    <a:pt x="8617110" y="0"/>
-                  </a:lnTo>
-                  <a:lnTo>
-                    <a:pt x="8617110" y="0"/>
+              <a:off x="1609207" y="2430958"/>
+              <a:ext cx="8379603" cy="0"/>
+            </a:xfrm>
+            <a:custGeom>
+              <a:avLst/>
+              <a:pathLst>
+                <a:path w="8379603" h="0">
+                  <a:moveTo>
+                    <a:pt x="0" y="0"/>
+                  </a:moveTo>
+                  <a:lnTo>
+                    <a:pt x="8379603" y="0"/>
+                  </a:lnTo>
+                  <a:lnTo>
+                    <a:pt x="8379603" y="0"/>
                   </a:lnTo>
                 </a:path>
               </a:pathLst>
@@ -2531,21 +2531,21 @@
           </p:nvSpPr>
           <p:spPr>
             <a:xfrm>
-              <a:off x="1371700" y="6680893"/>
-              <a:ext cx="8617110" cy="0"/>
-            </a:xfrm>
-            <a:custGeom>
-              <a:avLst/>
-              <a:pathLst>
-                <a:path w="8617110" h="0">
-                  <a:moveTo>
-                    <a:pt x="0" y="0"/>
-                  </a:moveTo>
-                  <a:lnTo>
-                    <a:pt x="8617110" y="0"/>
-                  </a:lnTo>
-                  <a:lnTo>
-                    <a:pt x="8617110" y="0"/>
+              <a:off x="1609207" y="6518147"/>
+              <a:ext cx="8379603" cy="0"/>
+            </a:xfrm>
+            <a:custGeom>
+              <a:avLst/>
+              <a:pathLst>
+                <a:path w="8379603" h="0">
+                  <a:moveTo>
+                    <a:pt x="0" y="0"/>
+                  </a:moveTo>
+                  <a:lnTo>
+                    <a:pt x="8379603" y="0"/>
+                  </a:lnTo>
+                  <a:lnTo>
+                    <a:pt x="8379603" y="0"/>
                   </a:lnTo>
                 </a:path>
               </a:pathLst>
@@ -2574,21 +2574,21 @@
           </p:nvSpPr>
           <p:spPr>
             <a:xfrm>
-              <a:off x="1371700" y="5421808"/>
-              <a:ext cx="8617110" cy="0"/>
-            </a:xfrm>
-            <a:custGeom>
-              <a:avLst/>
-              <a:pathLst>
-                <a:path w="8617110" h="0">
-                  <a:moveTo>
-                    <a:pt x="0" y="0"/>
-                  </a:moveTo>
-                  <a:lnTo>
-                    <a:pt x="8617110" y="0"/>
-                  </a:lnTo>
-                  <a:lnTo>
-                    <a:pt x="8617110" y="0"/>
+              <a:off x="1609207" y="5350379"/>
+              <a:ext cx="8379603" cy="0"/>
+            </a:xfrm>
+            <a:custGeom>
+              <a:avLst/>
+              <a:pathLst>
+                <a:path w="8379603" h="0">
+                  <a:moveTo>
+                    <a:pt x="0" y="0"/>
+                  </a:moveTo>
+                  <a:lnTo>
+                    <a:pt x="8379603" y="0"/>
+                  </a:lnTo>
+                  <a:lnTo>
+                    <a:pt x="8379603" y="0"/>
                   </a:lnTo>
                 </a:path>
               </a:pathLst>
@@ -2617,21 +2617,21 @@
           </p:nvSpPr>
           <p:spPr>
             <a:xfrm>
-              <a:off x="1371700" y="4162724"/>
-              <a:ext cx="8617110" cy="0"/>
-            </a:xfrm>
-            <a:custGeom>
-              <a:avLst/>
-              <a:pathLst>
-                <a:path w="8617110" h="0">
-                  <a:moveTo>
-                    <a:pt x="0" y="0"/>
-                  </a:moveTo>
-                  <a:lnTo>
-                    <a:pt x="8617110" y="0"/>
-                  </a:lnTo>
-                  <a:lnTo>
-                    <a:pt x="8617110" y="0"/>
+              <a:off x="1609207" y="4182611"/>
+              <a:ext cx="8379603" cy="0"/>
+            </a:xfrm>
+            <a:custGeom>
+              <a:avLst/>
+              <a:pathLst>
+                <a:path w="8379603" h="0">
+                  <a:moveTo>
+                    <a:pt x="0" y="0"/>
+                  </a:moveTo>
+                  <a:lnTo>
+                    <a:pt x="8379603" y="0"/>
+                  </a:lnTo>
+                  <a:lnTo>
+                    <a:pt x="8379603" y="0"/>
                   </a:lnTo>
                 </a:path>
               </a:pathLst>
@@ -2660,21 +2660,21 @@
           </p:nvSpPr>
           <p:spPr>
             <a:xfrm>
-              <a:off x="1371700" y="2903639"/>
-              <a:ext cx="8617110" cy="0"/>
-            </a:xfrm>
-            <a:custGeom>
-              <a:avLst/>
-              <a:pathLst>
-                <a:path w="8617110" h="0">
-                  <a:moveTo>
-                    <a:pt x="0" y="0"/>
-                  </a:moveTo>
-                  <a:lnTo>
-                    <a:pt x="8617110" y="0"/>
-                  </a:lnTo>
-                  <a:lnTo>
-                    <a:pt x="8617110" y="0"/>
+              <a:off x="1609207" y="3014842"/>
+              <a:ext cx="8379603" cy="0"/>
+            </a:xfrm>
+            <a:custGeom>
+              <a:avLst/>
+              <a:pathLst>
+                <a:path w="8379603" h="0">
+                  <a:moveTo>
+                    <a:pt x="0" y="0"/>
+                  </a:moveTo>
+                  <a:lnTo>
+                    <a:pt x="8379603" y="0"/>
+                  </a:lnTo>
+                  <a:lnTo>
+                    <a:pt x="8379603" y="0"/>
                   </a:lnTo>
                 </a:path>
               </a:pathLst>
@@ -2703,21 +2703,21 @@
           </p:nvSpPr>
           <p:spPr>
             <a:xfrm>
-              <a:off x="1371700" y="1644555"/>
-              <a:ext cx="8617110" cy="0"/>
-            </a:xfrm>
-            <a:custGeom>
-              <a:avLst/>
-              <a:pathLst>
-                <a:path w="8617110" h="0">
-                  <a:moveTo>
-                    <a:pt x="0" y="0"/>
-                  </a:moveTo>
-                  <a:lnTo>
-                    <a:pt x="8617110" y="0"/>
-                  </a:lnTo>
-                  <a:lnTo>
-                    <a:pt x="8617110" y="0"/>
+              <a:off x="1609207" y="1847074"/>
+              <a:ext cx="8379603" cy="0"/>
+            </a:xfrm>
+            <a:custGeom>
+              <a:avLst/>
+              <a:pathLst>
+                <a:path w="8379603" h="0">
+                  <a:moveTo>
+                    <a:pt x="0" y="0"/>
+                  </a:moveTo>
+                  <a:lnTo>
+                    <a:pt x="8379603" y="0"/>
+                  </a:lnTo>
+                  <a:lnTo>
+                    <a:pt x="8379603" y="0"/>
                   </a:lnTo>
                 </a:path>
               </a:pathLst>
@@ -2746,15 +2746,15 @@
           </p:nvSpPr>
           <p:spPr>
             <a:xfrm>
-              <a:off x="2002220" y="1392990"/>
-              <a:ext cx="0" cy="5534432"/>
-            </a:xfrm>
-            <a:custGeom>
-              <a:avLst/>
-              <a:pathLst>
-                <a:path w="0" h="5534432">
-                  <a:moveTo>
-                    <a:pt x="0" y="5534432"/>
+              <a:off x="2222349" y="1613754"/>
+              <a:ext cx="0" cy="5133042"/>
+            </a:xfrm>
+            <a:custGeom>
+              <a:avLst/>
+              <a:pathLst>
+                <a:path w="0" h="5133042">
+                  <a:moveTo>
+                    <a:pt x="0" y="5133042"/>
                   </a:moveTo>
                   <a:lnTo>
                     <a:pt x="0" y="0"/>
@@ -2789,15 +2789,15 @@
           </p:nvSpPr>
           <p:spPr>
             <a:xfrm>
-              <a:off x="3053087" y="1392990"/>
-              <a:ext cx="0" cy="5534432"/>
-            </a:xfrm>
-            <a:custGeom>
-              <a:avLst/>
-              <a:pathLst>
-                <a:path w="0" h="5534432">
-                  <a:moveTo>
-                    <a:pt x="0" y="5534432"/>
+              <a:off x="3244252" y="1613754"/>
+              <a:ext cx="0" cy="5133042"/>
+            </a:xfrm>
+            <a:custGeom>
+              <a:avLst/>
+              <a:pathLst>
+                <a:path w="0" h="5133042">
+                  <a:moveTo>
+                    <a:pt x="0" y="5133042"/>
                   </a:moveTo>
                   <a:lnTo>
                     <a:pt x="0" y="0"/>
@@ -2832,15 +2832,15 @@
           </p:nvSpPr>
           <p:spPr>
             <a:xfrm>
-              <a:off x="4103955" y="1392990"/>
-              <a:ext cx="0" cy="5534432"/>
-            </a:xfrm>
-            <a:custGeom>
-              <a:avLst/>
-              <a:pathLst>
-                <a:path w="0" h="5534432">
-                  <a:moveTo>
-                    <a:pt x="0" y="5534432"/>
+              <a:off x="4266155" y="1613754"/>
+              <a:ext cx="0" cy="5133042"/>
+            </a:xfrm>
+            <a:custGeom>
+              <a:avLst/>
+              <a:pathLst>
+                <a:path w="0" h="5133042">
+                  <a:moveTo>
+                    <a:pt x="0" y="5133042"/>
                   </a:moveTo>
                   <a:lnTo>
                     <a:pt x="0" y="0"/>
@@ -2875,15 +2875,15 @@
           </p:nvSpPr>
           <p:spPr>
             <a:xfrm>
-              <a:off x="5154822" y="1392990"/>
-              <a:ext cx="0" cy="5534432"/>
-            </a:xfrm>
-            <a:custGeom>
-              <a:avLst/>
-              <a:pathLst>
-                <a:path w="0" h="5534432">
-                  <a:moveTo>
-                    <a:pt x="0" y="5534432"/>
+              <a:off x="5288057" y="1613754"/>
+              <a:ext cx="0" cy="5133042"/>
+            </a:xfrm>
+            <a:custGeom>
+              <a:avLst/>
+              <a:pathLst>
+                <a:path w="0" h="5133042">
+                  <a:moveTo>
+                    <a:pt x="0" y="5133042"/>
                   </a:moveTo>
                   <a:lnTo>
                     <a:pt x="0" y="0"/>
@@ -2918,15 +2918,15 @@
           </p:nvSpPr>
           <p:spPr>
             <a:xfrm>
-              <a:off x="6205689" y="1392990"/>
-              <a:ext cx="0" cy="5534432"/>
-            </a:xfrm>
-            <a:custGeom>
-              <a:avLst/>
-              <a:pathLst>
-                <a:path w="0" h="5534432">
-                  <a:moveTo>
-                    <a:pt x="0" y="5534432"/>
+              <a:off x="6309960" y="1613754"/>
+              <a:ext cx="0" cy="5133042"/>
+            </a:xfrm>
+            <a:custGeom>
+              <a:avLst/>
+              <a:pathLst>
+                <a:path w="0" h="5133042">
+                  <a:moveTo>
+                    <a:pt x="0" y="5133042"/>
                   </a:moveTo>
                   <a:lnTo>
                     <a:pt x="0" y="0"/>
@@ -2961,15 +2961,15 @@
           </p:nvSpPr>
           <p:spPr>
             <a:xfrm>
-              <a:off x="7256556" y="1392990"/>
-              <a:ext cx="0" cy="5534432"/>
-            </a:xfrm>
-            <a:custGeom>
-              <a:avLst/>
-              <a:pathLst>
-                <a:path w="0" h="5534432">
-                  <a:moveTo>
-                    <a:pt x="0" y="5534432"/>
+              <a:off x="7331863" y="1613754"/>
+              <a:ext cx="0" cy="5133042"/>
+            </a:xfrm>
+            <a:custGeom>
+              <a:avLst/>
+              <a:pathLst>
+                <a:path w="0" h="5133042">
+                  <a:moveTo>
+                    <a:pt x="0" y="5133042"/>
                   </a:moveTo>
                   <a:lnTo>
                     <a:pt x="0" y="0"/>
@@ -3004,15 +3004,15 @@
           </p:nvSpPr>
           <p:spPr>
             <a:xfrm>
-              <a:off x="8307423" y="1392990"/>
-              <a:ext cx="0" cy="5534432"/>
-            </a:xfrm>
-            <a:custGeom>
-              <a:avLst/>
-              <a:pathLst>
-                <a:path w="0" h="5534432">
-                  <a:moveTo>
-                    <a:pt x="0" y="5534432"/>
+              <a:off x="8353766" y="1613754"/>
+              <a:ext cx="0" cy="5133042"/>
+            </a:xfrm>
+            <a:custGeom>
+              <a:avLst/>
+              <a:pathLst>
+                <a:path w="0" h="5133042">
+                  <a:moveTo>
+                    <a:pt x="0" y="5133042"/>
                   </a:moveTo>
                   <a:lnTo>
                     <a:pt x="0" y="0"/>
@@ -3047,15 +3047,15 @@
           </p:nvSpPr>
           <p:spPr>
             <a:xfrm>
-              <a:off x="9358290" y="1392990"/>
-              <a:ext cx="0" cy="5534432"/>
-            </a:xfrm>
-            <a:custGeom>
-              <a:avLst/>
-              <a:pathLst>
-                <a:path w="0" h="5534432">
-                  <a:moveTo>
-                    <a:pt x="0" y="5534432"/>
+              <a:off x="9375669" y="1613754"/>
+              <a:ext cx="0" cy="5133042"/>
+            </a:xfrm>
+            <a:custGeom>
+              <a:avLst/>
+              <a:pathLst>
+                <a:path w="0" h="5133042">
+                  <a:moveTo>
+                    <a:pt x="0" y="5133042"/>
                   </a:moveTo>
                   <a:lnTo>
                     <a:pt x="0" y="0"/>
@@ -3090,18 +3090,18 @@
           </p:nvSpPr>
           <p:spPr>
             <a:xfrm>
-              <a:off x="1739503" y="1644555"/>
-              <a:ext cx="525433" cy="0"/>
-            </a:xfrm>
-            <a:custGeom>
-              <a:avLst/>
-              <a:pathLst>
-                <a:path w="525433" h="0">
-                  <a:moveTo>
-                    <a:pt x="0" y="0"/>
-                  </a:moveTo>
-                  <a:lnTo>
-                    <a:pt x="525433" y="0"/>
+              <a:off x="1966873" y="1847074"/>
+              <a:ext cx="510951" cy="0"/>
+            </a:xfrm>
+            <a:custGeom>
+              <a:avLst/>
+              <a:pathLst>
+                <a:path w="510951" h="0">
+                  <a:moveTo>
+                    <a:pt x="0" y="0"/>
+                  </a:moveTo>
+                  <a:lnTo>
+                    <a:pt x="510951" y="0"/>
                   </a:lnTo>
                 </a:path>
               </a:pathLst>
@@ -3130,18 +3130,18 @@
           </p:nvSpPr>
           <p:spPr>
             <a:xfrm>
-              <a:off x="2002220" y="1644555"/>
-              <a:ext cx="0" cy="1855386"/>
-            </a:xfrm>
-            <a:custGeom>
-              <a:avLst/>
-              <a:pathLst>
-                <a:path w="0" h="1855386">
-                  <a:moveTo>
-                    <a:pt x="0" y="0"/>
-                  </a:moveTo>
-                  <a:lnTo>
-                    <a:pt x="0" y="1855386"/>
+              <a:off x="2222349" y="1847074"/>
+              <a:ext cx="0" cy="1720823"/>
+            </a:xfrm>
+            <a:custGeom>
+              <a:avLst/>
+              <a:pathLst>
+                <a:path w="0" h="1720823">
+                  <a:moveTo>
+                    <a:pt x="0" y="0"/>
+                  </a:moveTo>
+                  <a:lnTo>
+                    <a:pt x="0" y="1720823"/>
                   </a:lnTo>
                 </a:path>
               </a:pathLst>
@@ -3170,18 +3170,18 @@
           </p:nvSpPr>
           <p:spPr>
             <a:xfrm>
-              <a:off x="1739503" y="3499942"/>
-              <a:ext cx="525433" cy="0"/>
-            </a:xfrm>
-            <a:custGeom>
-              <a:avLst/>
-              <a:pathLst>
-                <a:path w="525433" h="0">
-                  <a:moveTo>
-                    <a:pt x="0" y="0"/>
-                  </a:moveTo>
-                  <a:lnTo>
-                    <a:pt x="525433" y="0"/>
+              <a:off x="1966873" y="3567897"/>
+              <a:ext cx="510951" cy="0"/>
+            </a:xfrm>
+            <a:custGeom>
+              <a:avLst/>
+              <a:pathLst>
+                <a:path w="510951" h="0">
+                  <a:moveTo>
+                    <a:pt x="0" y="0"/>
+                  </a:moveTo>
+                  <a:lnTo>
+                    <a:pt x="510951" y="0"/>
                   </a:lnTo>
                 </a:path>
               </a:pathLst>
@@ -3210,18 +3210,18 @@
           </p:nvSpPr>
           <p:spPr>
             <a:xfrm>
-              <a:off x="2790371" y="1669736"/>
-              <a:ext cx="525433" cy="0"/>
-            </a:xfrm>
-            <a:custGeom>
-              <a:avLst/>
-              <a:pathLst>
-                <a:path w="525433" h="0">
-                  <a:moveTo>
-                    <a:pt x="0" y="0"/>
-                  </a:moveTo>
-                  <a:lnTo>
-                    <a:pt x="525433" y="0"/>
+              <a:off x="2988776" y="1870429"/>
+              <a:ext cx="510951" cy="0"/>
+            </a:xfrm>
+            <a:custGeom>
+              <a:avLst/>
+              <a:pathLst>
+                <a:path w="510951" h="0">
+                  <a:moveTo>
+                    <a:pt x="0" y="0"/>
+                  </a:moveTo>
+                  <a:lnTo>
+                    <a:pt x="510951" y="0"/>
                   </a:lnTo>
                 </a:path>
               </a:pathLst>
@@ -3250,18 +3250,18 @@
           </p:nvSpPr>
           <p:spPr>
             <a:xfrm>
-              <a:off x="3053087" y="1669736"/>
-              <a:ext cx="0" cy="1195123"/>
-            </a:xfrm>
-            <a:custGeom>
-              <a:avLst/>
-              <a:pathLst>
-                <a:path w="0" h="1195123">
-                  <a:moveTo>
-                    <a:pt x="0" y="0"/>
-                  </a:moveTo>
-                  <a:lnTo>
-                    <a:pt x="0" y="1195123"/>
+              <a:off x="3244252" y="1870429"/>
+              <a:ext cx="0" cy="1108445"/>
+            </a:xfrm>
+            <a:custGeom>
+              <a:avLst/>
+              <a:pathLst>
+                <a:path w="0" h="1108445">
+                  <a:moveTo>
+                    <a:pt x="0" y="0"/>
+                  </a:moveTo>
+                  <a:lnTo>
+                    <a:pt x="0" y="1108445"/>
                   </a:lnTo>
                 </a:path>
               </a:pathLst>
@@ -3290,18 +3290,18 @@
           </p:nvSpPr>
           <p:spPr>
             <a:xfrm>
-              <a:off x="2790371" y="2864859"/>
-              <a:ext cx="525433" cy="0"/>
-            </a:xfrm>
-            <a:custGeom>
-              <a:avLst/>
-              <a:pathLst>
-                <a:path w="525433" h="0">
-                  <a:moveTo>
-                    <a:pt x="0" y="0"/>
-                  </a:moveTo>
-                  <a:lnTo>
-                    <a:pt x="525433" y="0"/>
+              <a:off x="2988776" y="2978875"/>
+              <a:ext cx="510951" cy="0"/>
+            </a:xfrm>
+            <a:custGeom>
+              <a:avLst/>
+              <a:pathLst>
+                <a:path w="510951" h="0">
+                  <a:moveTo>
+                    <a:pt x="0" y="0"/>
+                  </a:moveTo>
+                  <a:lnTo>
+                    <a:pt x="510951" y="0"/>
                   </a:lnTo>
                 </a:path>
               </a:pathLst>
@@ -3330,18 +3330,18 @@
           </p:nvSpPr>
           <p:spPr>
             <a:xfrm>
-              <a:off x="3841238" y="1644555"/>
-              <a:ext cx="525433" cy="0"/>
-            </a:xfrm>
-            <a:custGeom>
-              <a:avLst/>
-              <a:pathLst>
-                <a:path w="525433" h="0">
-                  <a:moveTo>
-                    <a:pt x="0" y="0"/>
-                  </a:moveTo>
-                  <a:lnTo>
-                    <a:pt x="525433" y="0"/>
+              <a:off x="4010679" y="1847074"/>
+              <a:ext cx="510951" cy="0"/>
+            </a:xfrm>
+            <a:custGeom>
+              <a:avLst/>
+              <a:pathLst>
+                <a:path w="510951" h="0">
+                  <a:moveTo>
+                    <a:pt x="0" y="0"/>
+                  </a:moveTo>
+                  <a:lnTo>
+                    <a:pt x="510951" y="0"/>
                   </a:lnTo>
                 </a:path>
               </a:pathLst>
@@ -3370,18 +3370,18 @@
           </p:nvSpPr>
           <p:spPr>
             <a:xfrm>
-              <a:off x="4103955" y="1644555"/>
-              <a:ext cx="0" cy="1201166"/>
-            </a:xfrm>
-            <a:custGeom>
-              <a:avLst/>
-              <a:pathLst>
-                <a:path w="0" h="1201166">
-                  <a:moveTo>
-                    <a:pt x="0" y="0"/>
-                  </a:moveTo>
-                  <a:lnTo>
-                    <a:pt x="0" y="1201166"/>
+              <a:off x="4266155" y="1847074"/>
+              <a:ext cx="0" cy="1114051"/>
+            </a:xfrm>
+            <a:custGeom>
+              <a:avLst/>
+              <a:pathLst>
+                <a:path w="0" h="1114051">
+                  <a:moveTo>
+                    <a:pt x="0" y="0"/>
+                  </a:moveTo>
+                  <a:lnTo>
+                    <a:pt x="0" y="1114051"/>
                   </a:lnTo>
                 </a:path>
               </a:pathLst>
@@ -3410,18 +3410,18 @@
           </p:nvSpPr>
           <p:spPr>
             <a:xfrm>
-              <a:off x="3841238" y="2845721"/>
-              <a:ext cx="525433" cy="0"/>
-            </a:xfrm>
-            <a:custGeom>
-              <a:avLst/>
-              <a:pathLst>
-                <a:path w="525433" h="0">
-                  <a:moveTo>
-                    <a:pt x="0" y="0"/>
-                  </a:moveTo>
-                  <a:lnTo>
-                    <a:pt x="525433" y="0"/>
+              <a:off x="4010679" y="2961125"/>
+              <a:ext cx="510951" cy="0"/>
+            </a:xfrm>
+            <a:custGeom>
+              <a:avLst/>
+              <a:pathLst>
+                <a:path w="510951" h="0">
+                  <a:moveTo>
+                    <a:pt x="0" y="0"/>
+                  </a:moveTo>
+                  <a:lnTo>
+                    <a:pt x="510951" y="0"/>
                   </a:lnTo>
                 </a:path>
               </a:pathLst>
@@ -3450,18 +3450,18 @@
           </p:nvSpPr>
           <p:spPr>
             <a:xfrm>
-              <a:off x="4892105" y="2671464"/>
-              <a:ext cx="525433" cy="0"/>
-            </a:xfrm>
-            <a:custGeom>
-              <a:avLst/>
-              <a:pathLst>
-                <a:path w="525433" h="0">
-                  <a:moveTo>
-                    <a:pt x="0" y="0"/>
-                  </a:moveTo>
-                  <a:lnTo>
-                    <a:pt x="525433" y="0"/>
+              <a:off x="5032582" y="2799506"/>
+              <a:ext cx="510951" cy="0"/>
+            </a:xfrm>
+            <a:custGeom>
+              <a:avLst/>
+              <a:pathLst>
+                <a:path w="510951" h="0">
+                  <a:moveTo>
+                    <a:pt x="0" y="0"/>
+                  </a:moveTo>
+                  <a:lnTo>
+                    <a:pt x="510951" y="0"/>
                   </a:lnTo>
                 </a:path>
               </a:pathLst>
@@ -3490,18 +3490,18 @@
           </p:nvSpPr>
           <p:spPr>
             <a:xfrm>
-              <a:off x="5154822" y="2671464"/>
-              <a:ext cx="0" cy="3061590"/>
-            </a:xfrm>
-            <a:custGeom>
-              <a:avLst/>
-              <a:pathLst>
-                <a:path w="0" h="3061590">
-                  <a:moveTo>
-                    <a:pt x="0" y="0"/>
-                  </a:moveTo>
-                  <a:lnTo>
-                    <a:pt x="0" y="3061590"/>
+              <a:off x="5288057" y="2799506"/>
+              <a:ext cx="0" cy="2839545"/>
+            </a:xfrm>
+            <a:custGeom>
+              <a:avLst/>
+              <a:pathLst>
+                <a:path w="0" h="2839545">
+                  <a:moveTo>
+                    <a:pt x="0" y="0"/>
+                  </a:moveTo>
+                  <a:lnTo>
+                    <a:pt x="0" y="2839545"/>
                   </a:lnTo>
                 </a:path>
               </a:pathLst>
@@ -3530,18 +3530,18 @@
           </p:nvSpPr>
           <p:spPr>
             <a:xfrm>
-              <a:off x="4892105" y="5733054"/>
-              <a:ext cx="525433" cy="0"/>
-            </a:xfrm>
-            <a:custGeom>
-              <a:avLst/>
-              <a:pathLst>
-                <a:path w="525433" h="0">
-                  <a:moveTo>
-                    <a:pt x="0" y="0"/>
-                  </a:moveTo>
-                  <a:lnTo>
-                    <a:pt x="525433" y="0"/>
+              <a:off x="5032582" y="5639051"/>
+              <a:ext cx="510951" cy="0"/>
+            </a:xfrm>
+            <a:custGeom>
+              <a:avLst/>
+              <a:pathLst>
+                <a:path w="510951" h="0">
+                  <a:moveTo>
+                    <a:pt x="0" y="0"/>
+                  </a:moveTo>
+                  <a:lnTo>
+                    <a:pt x="510951" y="0"/>
                   </a:lnTo>
                 </a:path>
               </a:pathLst>
@@ -3570,18 +3570,18 @@
           </p:nvSpPr>
           <p:spPr>
             <a:xfrm>
-              <a:off x="5942972" y="2217186"/>
-              <a:ext cx="525433" cy="0"/>
-            </a:xfrm>
-            <a:custGeom>
-              <a:avLst/>
-              <a:pathLst>
-                <a:path w="525433" h="0">
-                  <a:moveTo>
-                    <a:pt x="0" y="0"/>
-                  </a:moveTo>
-                  <a:lnTo>
-                    <a:pt x="525433" y="0"/>
+              <a:off x="6054485" y="2378175"/>
+              <a:ext cx="510951" cy="0"/>
+            </a:xfrm>
+            <a:custGeom>
+              <a:avLst/>
+              <a:pathLst>
+                <a:path w="510951" h="0">
+                  <a:moveTo>
+                    <a:pt x="0" y="0"/>
+                  </a:moveTo>
+                  <a:lnTo>
+                    <a:pt x="510951" y="0"/>
                   </a:lnTo>
                 </a:path>
               </a:pathLst>
@@ -3610,18 +3610,18 @@
           </p:nvSpPr>
           <p:spPr>
             <a:xfrm>
-              <a:off x="6205689" y="2217186"/>
-              <a:ext cx="0" cy="4364994"/>
-            </a:xfrm>
-            <a:custGeom>
-              <a:avLst/>
-              <a:pathLst>
-                <a:path w="0" h="4364994">
-                  <a:moveTo>
-                    <a:pt x="0" y="0"/>
-                  </a:moveTo>
-                  <a:lnTo>
-                    <a:pt x="0" y="4364994"/>
+              <a:off x="6309960" y="2378175"/>
+              <a:ext cx="0" cy="4048419"/>
+            </a:xfrm>
+            <a:custGeom>
+              <a:avLst/>
+              <a:pathLst>
+                <a:path w="0" h="4048419">
+                  <a:moveTo>
+                    <a:pt x="0" y="0"/>
+                  </a:moveTo>
+                  <a:lnTo>
+                    <a:pt x="0" y="4048419"/>
                   </a:lnTo>
                 </a:path>
               </a:pathLst>
@@ -3650,18 +3650,18 @@
           </p:nvSpPr>
           <p:spPr>
             <a:xfrm>
-              <a:off x="5942972" y="6582181"/>
-              <a:ext cx="525433" cy="0"/>
-            </a:xfrm>
-            <a:custGeom>
-              <a:avLst/>
-              <a:pathLst>
-                <a:path w="525433" h="0">
-                  <a:moveTo>
-                    <a:pt x="0" y="0"/>
-                  </a:moveTo>
-                  <a:lnTo>
-                    <a:pt x="525433" y="0"/>
+              <a:off x="6054485" y="6426594"/>
+              <a:ext cx="510951" cy="0"/>
+            </a:xfrm>
+            <a:custGeom>
+              <a:avLst/>
+              <a:pathLst>
+                <a:path w="510951" h="0">
+                  <a:moveTo>
+                    <a:pt x="0" y="0"/>
+                  </a:moveTo>
+                  <a:lnTo>
+                    <a:pt x="510951" y="0"/>
                   </a:lnTo>
                 </a:path>
               </a:pathLst>
@@ -3690,18 +3690,18 @@
           </p:nvSpPr>
           <p:spPr>
             <a:xfrm>
-              <a:off x="6993839" y="2454398"/>
-              <a:ext cx="525433" cy="0"/>
-            </a:xfrm>
-            <a:custGeom>
-              <a:avLst/>
-              <a:pathLst>
-                <a:path w="525433" h="0">
-                  <a:moveTo>
-                    <a:pt x="0" y="0"/>
-                  </a:moveTo>
-                  <a:lnTo>
-                    <a:pt x="525433" y="0"/>
+              <a:off x="7076387" y="2598182"/>
+              <a:ext cx="510951" cy="0"/>
+            </a:xfrm>
+            <a:custGeom>
+              <a:avLst/>
+              <a:pathLst>
+                <a:path w="510951" h="0">
+                  <a:moveTo>
+                    <a:pt x="0" y="0"/>
+                  </a:moveTo>
+                  <a:lnTo>
+                    <a:pt x="510951" y="0"/>
                   </a:lnTo>
                 </a:path>
               </a:pathLst>
@@ -3730,18 +3730,18 @@
           </p:nvSpPr>
           <p:spPr>
             <a:xfrm>
-              <a:off x="7256556" y="2454398"/>
-              <a:ext cx="0" cy="2014535"/>
-            </a:xfrm>
-            <a:custGeom>
-              <a:avLst/>
-              <a:pathLst>
-                <a:path w="0" h="2014535">
-                  <a:moveTo>
-                    <a:pt x="0" y="0"/>
-                  </a:moveTo>
-                  <a:lnTo>
-                    <a:pt x="0" y="2014535"/>
+              <a:off x="7331863" y="2598182"/>
+              <a:ext cx="0" cy="1868429"/>
+            </a:xfrm>
+            <a:custGeom>
+              <a:avLst/>
+              <a:pathLst>
+                <a:path w="0" h="1868429">
+                  <a:moveTo>
+                    <a:pt x="0" y="0"/>
+                  </a:moveTo>
+                  <a:lnTo>
+                    <a:pt x="0" y="1868429"/>
                   </a:lnTo>
                 </a:path>
               </a:pathLst>
@@ -3770,18 +3770,18 @@
           </p:nvSpPr>
           <p:spPr>
             <a:xfrm>
-              <a:off x="6993839" y="4468933"/>
-              <a:ext cx="525433" cy="0"/>
-            </a:xfrm>
-            <a:custGeom>
-              <a:avLst/>
-              <a:pathLst>
-                <a:path w="525433" h="0">
-                  <a:moveTo>
-                    <a:pt x="0" y="0"/>
-                  </a:moveTo>
-                  <a:lnTo>
-                    <a:pt x="525433" y="0"/>
+              <a:off x="7076387" y="4466612"/>
+              <a:ext cx="510951" cy="0"/>
+            </a:xfrm>
+            <a:custGeom>
+              <a:avLst/>
+              <a:pathLst>
+                <a:path w="510951" h="0">
+                  <a:moveTo>
+                    <a:pt x="0" y="0"/>
+                  </a:moveTo>
+                  <a:lnTo>
+                    <a:pt x="510951" y="0"/>
                   </a:lnTo>
                 </a:path>
               </a:pathLst>
@@ -3810,18 +3810,18 @@
           </p:nvSpPr>
           <p:spPr>
             <a:xfrm>
-              <a:off x="8044706" y="1644555"/>
-              <a:ext cx="525433" cy="0"/>
-            </a:xfrm>
-            <a:custGeom>
-              <a:avLst/>
-              <a:pathLst>
-                <a:path w="525433" h="0">
-                  <a:moveTo>
-                    <a:pt x="0" y="0"/>
-                  </a:moveTo>
-                  <a:lnTo>
-                    <a:pt x="525433" y="0"/>
+              <a:off x="8098290" y="1847074"/>
+              <a:ext cx="510951" cy="0"/>
+            </a:xfrm>
+            <a:custGeom>
+              <a:avLst/>
+              <a:pathLst>
+                <a:path w="510951" h="0">
+                  <a:moveTo>
+                    <a:pt x="0" y="0"/>
+                  </a:moveTo>
+                  <a:lnTo>
+                    <a:pt x="510951" y="0"/>
                   </a:lnTo>
                 </a:path>
               </a:pathLst>
@@ -3850,18 +3850,18 @@
           </p:nvSpPr>
           <p:spPr>
             <a:xfrm>
-              <a:off x="8307423" y="1644555"/>
-              <a:ext cx="0" cy="1057631"/>
-            </a:xfrm>
-            <a:custGeom>
-              <a:avLst/>
-              <a:pathLst>
-                <a:path w="0" h="1057631">
-                  <a:moveTo>
-                    <a:pt x="0" y="0"/>
-                  </a:moveTo>
-                  <a:lnTo>
-                    <a:pt x="0" y="1057631"/>
+              <a:off x="8353766" y="1847074"/>
+              <a:ext cx="0" cy="980925"/>
+            </a:xfrm>
+            <a:custGeom>
+              <a:avLst/>
+              <a:pathLst>
+                <a:path w="0" h="980925">
+                  <a:moveTo>
+                    <a:pt x="0" y="0"/>
+                  </a:moveTo>
+                  <a:lnTo>
+                    <a:pt x="0" y="980925"/>
                   </a:lnTo>
                 </a:path>
               </a:pathLst>
@@ -3890,18 +3890,18 @@
           </p:nvSpPr>
           <p:spPr>
             <a:xfrm>
-              <a:off x="8044706" y="2702186"/>
-              <a:ext cx="525433" cy="0"/>
-            </a:xfrm>
-            <a:custGeom>
-              <a:avLst/>
-              <a:pathLst>
-                <a:path w="525433" h="0">
-                  <a:moveTo>
-                    <a:pt x="0" y="0"/>
-                  </a:moveTo>
-                  <a:lnTo>
-                    <a:pt x="525433" y="0"/>
+              <a:off x="8098290" y="2827999"/>
+              <a:ext cx="510951" cy="0"/>
+            </a:xfrm>
+            <a:custGeom>
+              <a:avLst/>
+              <a:pathLst>
+                <a:path w="510951" h="0">
+                  <a:moveTo>
+                    <a:pt x="0" y="0"/>
+                  </a:moveTo>
+                  <a:lnTo>
+                    <a:pt x="510951" y="0"/>
                   </a:lnTo>
                 </a:path>
               </a:pathLst>
@@ -3930,18 +3930,18 @@
           </p:nvSpPr>
           <p:spPr>
             <a:xfrm>
-              <a:off x="9095573" y="1654627"/>
-              <a:ext cx="525433" cy="0"/>
-            </a:xfrm>
-            <a:custGeom>
-              <a:avLst/>
-              <a:pathLst>
-                <a:path w="525433" h="0">
-                  <a:moveTo>
-                    <a:pt x="0" y="0"/>
-                  </a:moveTo>
-                  <a:lnTo>
-                    <a:pt x="525433" y="0"/>
+              <a:off x="9120193" y="1856416"/>
+              <a:ext cx="510951" cy="0"/>
+            </a:xfrm>
+            <a:custGeom>
+              <a:avLst/>
+              <a:pathLst>
+                <a:path w="510951" h="0">
+                  <a:moveTo>
+                    <a:pt x="0" y="0"/>
+                  </a:moveTo>
+                  <a:lnTo>
+                    <a:pt x="510951" y="0"/>
                   </a:lnTo>
                 </a:path>
               </a:pathLst>
@@ -3970,18 +3970,18 @@
           </p:nvSpPr>
           <p:spPr>
             <a:xfrm>
-              <a:off x="9358290" y="1654627"/>
-              <a:ext cx="0" cy="2014535"/>
-            </a:xfrm>
-            <a:custGeom>
-              <a:avLst/>
-              <a:pathLst>
-                <a:path w="0" h="2014535">
-                  <a:moveTo>
-                    <a:pt x="0" y="0"/>
-                  </a:moveTo>
-                  <a:lnTo>
-                    <a:pt x="0" y="2014535"/>
+              <a:off x="9375669" y="1856416"/>
+              <a:ext cx="0" cy="1868429"/>
+            </a:xfrm>
+            <a:custGeom>
+              <a:avLst/>
+              <a:pathLst>
+                <a:path w="0" h="1868429">
+                  <a:moveTo>
+                    <a:pt x="0" y="0"/>
+                  </a:moveTo>
+                  <a:lnTo>
+                    <a:pt x="0" y="1868429"/>
                   </a:lnTo>
                 </a:path>
               </a:pathLst>
@@ -4010,18 +4010,18 @@
           </p:nvSpPr>
           <p:spPr>
             <a:xfrm>
-              <a:off x="9095573" y="3669163"/>
-              <a:ext cx="525433" cy="0"/>
-            </a:xfrm>
-            <a:custGeom>
-              <a:avLst/>
-              <a:pathLst>
-                <a:path w="525433" h="0">
-                  <a:moveTo>
-                    <a:pt x="0" y="0"/>
-                  </a:moveTo>
-                  <a:lnTo>
-                    <a:pt x="525433" y="0"/>
+              <a:off x="9120193" y="3724845"/>
+              <a:ext cx="510951" cy="0"/>
+            </a:xfrm>
+            <a:custGeom>
+              <a:avLst/>
+              <a:pathLst>
+                <a:path w="510951" h="0">
+                  <a:moveTo>
+                    <a:pt x="0" y="0"/>
+                  </a:moveTo>
+                  <a:lnTo>
+                    <a:pt x="510951" y="0"/>
                   </a:lnTo>
                 </a:path>
               </a:pathLst>
@@ -4050,15 +4050,15 @@
           </p:nvSpPr>
           <p:spPr>
             <a:xfrm>
-              <a:off x="2002220" y="1644555"/>
-              <a:ext cx="0" cy="118479"/>
-            </a:xfrm>
-            <a:custGeom>
-              <a:avLst/>
-              <a:pathLst>
-                <a:path w="0" h="118479">
-                  <a:moveTo>
-                    <a:pt x="0" y="118479"/>
+              <a:off x="2222349" y="1847074"/>
+              <a:ext cx="0" cy="109887"/>
+            </a:xfrm>
+            <a:custGeom>
+              <a:avLst/>
+              <a:pathLst>
+                <a:path w="0" h="109887">
+                  <a:moveTo>
+                    <a:pt x="0" y="109887"/>
                   </a:moveTo>
                   <a:lnTo>
                     <a:pt x="0" y="0"/>
@@ -4090,18 +4090,18 @@
           </p:nvSpPr>
           <p:spPr>
             <a:xfrm>
-              <a:off x="2002220" y="2478195"/>
-              <a:ext cx="0" cy="1021747"/>
-            </a:xfrm>
-            <a:custGeom>
-              <a:avLst/>
-              <a:pathLst>
-                <a:path w="0" h="1021747">
-                  <a:moveTo>
-                    <a:pt x="0" y="0"/>
-                  </a:moveTo>
-                  <a:lnTo>
-                    <a:pt x="0" y="1021747"/>
+              <a:off x="2222349" y="2620253"/>
+              <a:ext cx="0" cy="947644"/>
+            </a:xfrm>
+            <a:custGeom>
+              <a:avLst/>
+              <a:pathLst>
+                <a:path w="0" h="947644">
+                  <a:moveTo>
+                    <a:pt x="0" y="0"/>
+                  </a:moveTo>
+                  <a:lnTo>
+                    <a:pt x="0" y="947644"/>
                   </a:lnTo>
                 </a:path>
               </a:pathLst>
@@ -4130,24 +4130,24 @@
           </p:nvSpPr>
           <p:spPr>
             <a:xfrm>
-              <a:off x="1608145" y="1763034"/>
-              <a:ext cx="788150" cy="715160"/>
-            </a:xfrm>
-            <a:custGeom>
-              <a:avLst/>
-              <a:pathLst>
-                <a:path w="788150" h="715160">
-                  <a:moveTo>
-                    <a:pt x="0" y="0"/>
-                  </a:moveTo>
-                  <a:lnTo>
-                    <a:pt x="0" y="715160"/>
-                  </a:lnTo>
-                  <a:lnTo>
-                    <a:pt x="788150" y="715160"/>
-                  </a:lnTo>
-                  <a:lnTo>
-                    <a:pt x="788150" y="0"/>
+              <a:off x="1839135" y="1956961"/>
+              <a:ext cx="766427" cy="663292"/>
+            </a:xfrm>
+            <a:custGeom>
+              <a:avLst/>
+              <a:pathLst>
+                <a:path w="766427" h="663292">
+                  <a:moveTo>
+                    <a:pt x="0" y="0"/>
+                  </a:moveTo>
+                  <a:lnTo>
+                    <a:pt x="0" y="663292"/>
+                  </a:lnTo>
+                  <a:lnTo>
+                    <a:pt x="766427" y="663292"/>
+                  </a:lnTo>
+                  <a:lnTo>
+                    <a:pt x="766427" y="0"/>
                   </a:lnTo>
                   <a:close/>
                 </a:path>
@@ -4182,18 +4182,18 @@
           </p:nvSpPr>
           <p:spPr>
             <a:xfrm>
-              <a:off x="1608145" y="1941447"/>
-              <a:ext cx="788150" cy="0"/>
-            </a:xfrm>
-            <a:custGeom>
-              <a:avLst/>
-              <a:pathLst>
-                <a:path w="788150" h="0">
-                  <a:moveTo>
-                    <a:pt x="0" y="0"/>
-                  </a:moveTo>
-                  <a:lnTo>
-                    <a:pt x="788150" y="0"/>
+              <a:off x="1839135" y="2122434"/>
+              <a:ext cx="766427" cy="0"/>
+            </a:xfrm>
+            <a:custGeom>
+              <a:avLst/>
+              <a:pathLst>
+                <a:path w="766427" h="0">
+                  <a:moveTo>
+                    <a:pt x="0" y="0"/>
+                  </a:moveTo>
+                  <a:lnTo>
+                    <a:pt x="766427" y="0"/>
                   </a:lnTo>
                 </a:path>
               </a:pathLst>
@@ -4222,15 +4222,15 @@
           </p:nvSpPr>
           <p:spPr>
             <a:xfrm>
-              <a:off x="3053087" y="1669736"/>
-              <a:ext cx="0" cy="150838"/>
-            </a:xfrm>
-            <a:custGeom>
-              <a:avLst/>
-              <a:pathLst>
-                <a:path w="0" h="150838">
-                  <a:moveTo>
-                    <a:pt x="0" y="150838"/>
+              <a:off x="3244252" y="1870429"/>
+              <a:ext cx="0" cy="139898"/>
+            </a:xfrm>
+            <a:custGeom>
+              <a:avLst/>
+              <a:pathLst>
+                <a:path w="0" h="139898">
+                  <a:moveTo>
+                    <a:pt x="0" y="139898"/>
                   </a:moveTo>
                   <a:lnTo>
                     <a:pt x="0" y="0"/>
@@ -4262,18 +4262,18 @@
           </p:nvSpPr>
           <p:spPr>
             <a:xfrm>
-              <a:off x="3053087" y="2246901"/>
-              <a:ext cx="0" cy="617958"/>
-            </a:xfrm>
-            <a:custGeom>
-              <a:avLst/>
-              <a:pathLst>
-                <a:path w="0" h="617958">
-                  <a:moveTo>
-                    <a:pt x="0" y="0"/>
-                  </a:moveTo>
-                  <a:lnTo>
-                    <a:pt x="0" y="617958"/>
+              <a:off x="3244252" y="2405734"/>
+              <a:ext cx="0" cy="573140"/>
+            </a:xfrm>
+            <a:custGeom>
+              <a:avLst/>
+              <a:pathLst>
+                <a:path w="0" h="573140">
+                  <a:moveTo>
+                    <a:pt x="0" y="0"/>
+                  </a:moveTo>
+                  <a:lnTo>
+                    <a:pt x="0" y="573140"/>
                   </a:lnTo>
                 </a:path>
               </a:pathLst>
@@ -4302,24 +4302,24 @@
           </p:nvSpPr>
           <p:spPr>
             <a:xfrm>
-              <a:off x="2659012" y="1820575"/>
-              <a:ext cx="788150" cy="426326"/>
-            </a:xfrm>
-            <a:custGeom>
-              <a:avLst/>
-              <a:pathLst>
-                <a:path w="788150" h="426326">
-                  <a:moveTo>
-                    <a:pt x="0" y="0"/>
-                  </a:moveTo>
-                  <a:lnTo>
-                    <a:pt x="0" y="426326"/>
-                  </a:lnTo>
-                  <a:lnTo>
-                    <a:pt x="788150" y="426326"/>
-                  </a:lnTo>
-                  <a:lnTo>
-                    <a:pt x="788150" y="0"/>
+              <a:off x="2861038" y="2010328"/>
+              <a:ext cx="766427" cy="395406"/>
+            </a:xfrm>
+            <a:custGeom>
+              <a:avLst/>
+              <a:pathLst>
+                <a:path w="766427" h="395406">
+                  <a:moveTo>
+                    <a:pt x="0" y="0"/>
+                  </a:moveTo>
+                  <a:lnTo>
+                    <a:pt x="0" y="395406"/>
+                  </a:lnTo>
+                  <a:lnTo>
+                    <a:pt x="766427" y="395406"/>
+                  </a:lnTo>
+                  <a:lnTo>
+                    <a:pt x="766427" y="0"/>
                   </a:lnTo>
                   <a:close/>
                 </a:path>
@@ -4354,18 +4354,18 @@
           </p:nvSpPr>
           <p:spPr>
             <a:xfrm>
-              <a:off x="2659012" y="1989544"/>
-              <a:ext cx="788150" cy="0"/>
-            </a:xfrm>
-            <a:custGeom>
-              <a:avLst/>
-              <a:pathLst>
-                <a:path w="788150" h="0">
-                  <a:moveTo>
-                    <a:pt x="0" y="0"/>
-                  </a:moveTo>
-                  <a:lnTo>
-                    <a:pt x="788150" y="0"/>
+              <a:off x="2861038" y="2167042"/>
+              <a:ext cx="766427" cy="0"/>
+            </a:xfrm>
+            <a:custGeom>
+              <a:avLst/>
+              <a:pathLst>
+                <a:path w="766427" h="0">
+                  <a:moveTo>
+                    <a:pt x="0" y="0"/>
+                  </a:moveTo>
+                  <a:lnTo>
+                    <a:pt x="766427" y="0"/>
                   </a:lnTo>
                 </a:path>
               </a:pathLst>
@@ -4394,15 +4394,15 @@
           </p:nvSpPr>
           <p:spPr>
             <a:xfrm>
-              <a:off x="4103955" y="1644555"/>
-              <a:ext cx="0" cy="38779"/>
-            </a:xfrm>
-            <a:custGeom>
-              <a:avLst/>
-              <a:pathLst>
-                <a:path w="0" h="38779">
-                  <a:moveTo>
-                    <a:pt x="0" y="38779"/>
+              <a:off x="4266155" y="1847074"/>
+              <a:ext cx="0" cy="35967"/>
+            </a:xfrm>
+            <a:custGeom>
+              <a:avLst/>
+              <a:pathLst>
+                <a:path w="0" h="35967">
+                  <a:moveTo>
+                    <a:pt x="0" y="35967"/>
                   </a:moveTo>
                   <a:lnTo>
                     <a:pt x="0" y="0"/>
@@ -4434,18 +4434,18 @@
           </p:nvSpPr>
           <p:spPr>
             <a:xfrm>
-              <a:off x="4103955" y="2157883"/>
-              <a:ext cx="0" cy="687837"/>
-            </a:xfrm>
-            <a:custGeom>
-              <a:avLst/>
-              <a:pathLst>
-                <a:path w="0" h="687837">
-                  <a:moveTo>
-                    <a:pt x="0" y="0"/>
-                  </a:moveTo>
-                  <a:lnTo>
-                    <a:pt x="0" y="687837"/>
+              <a:off x="4266155" y="2323173"/>
+              <a:ext cx="0" cy="637951"/>
+            </a:xfrm>
+            <a:custGeom>
+              <a:avLst/>
+              <a:pathLst>
+                <a:path w="0" h="637951">
+                  <a:moveTo>
+                    <a:pt x="0" y="0"/>
+                  </a:moveTo>
+                  <a:lnTo>
+                    <a:pt x="0" y="637951"/>
                   </a:lnTo>
                 </a:path>
               </a:pathLst>
@@ -4474,24 +4474,24 @@
           </p:nvSpPr>
           <p:spPr>
             <a:xfrm>
-              <a:off x="3709879" y="1683334"/>
-              <a:ext cx="788150" cy="474548"/>
-            </a:xfrm>
-            <a:custGeom>
-              <a:avLst/>
-              <a:pathLst>
-                <a:path w="788150" h="474548">
-                  <a:moveTo>
-                    <a:pt x="0" y="0"/>
-                  </a:moveTo>
-                  <a:lnTo>
-                    <a:pt x="0" y="474548"/>
-                  </a:lnTo>
-                  <a:lnTo>
-                    <a:pt x="788150" y="474548"/>
-                  </a:lnTo>
-                  <a:lnTo>
-                    <a:pt x="788150" y="0"/>
+              <a:off x="3882941" y="1883041"/>
+              <a:ext cx="766427" cy="440131"/>
+            </a:xfrm>
+            <a:custGeom>
+              <a:avLst/>
+              <a:pathLst>
+                <a:path w="766427" h="440131">
+                  <a:moveTo>
+                    <a:pt x="0" y="0"/>
+                  </a:moveTo>
+                  <a:lnTo>
+                    <a:pt x="0" y="440131"/>
+                  </a:lnTo>
+                  <a:lnTo>
+                    <a:pt x="766427" y="440131"/>
+                  </a:lnTo>
+                  <a:lnTo>
+                    <a:pt x="766427" y="0"/>
                   </a:lnTo>
                   <a:close/>
                 </a:path>
@@ -4526,18 +4526,18 @@
           </p:nvSpPr>
           <p:spPr>
             <a:xfrm>
-              <a:off x="3709879" y="1819064"/>
-              <a:ext cx="788150" cy="0"/>
-            </a:xfrm>
-            <a:custGeom>
-              <a:avLst/>
-              <a:pathLst>
-                <a:path w="788150" h="0">
-                  <a:moveTo>
-                    <a:pt x="0" y="0"/>
-                  </a:moveTo>
-                  <a:lnTo>
-                    <a:pt x="788150" y="0"/>
+              <a:off x="3882941" y="2008927"/>
+              <a:ext cx="766427" cy="0"/>
+            </a:xfrm>
+            <a:custGeom>
+              <a:avLst/>
+              <a:pathLst>
+                <a:path w="766427" h="0">
+                  <a:moveTo>
+                    <a:pt x="0" y="0"/>
+                  </a:moveTo>
+                  <a:lnTo>
+                    <a:pt x="766427" y="0"/>
                   </a:lnTo>
                 </a:path>
               </a:pathLst>
@@ -4566,15 +4566,15 @@
           </p:nvSpPr>
           <p:spPr>
             <a:xfrm>
-              <a:off x="5154822" y="2671464"/>
-              <a:ext cx="0" cy="1352508"/>
-            </a:xfrm>
-            <a:custGeom>
-              <a:avLst/>
-              <a:pathLst>
-                <a:path w="0" h="1352508">
-                  <a:moveTo>
-                    <a:pt x="0" y="1352508"/>
+              <a:off x="5288057" y="2799506"/>
+              <a:ext cx="0" cy="1254416"/>
+            </a:xfrm>
+            <a:custGeom>
+              <a:avLst/>
+              <a:pathLst>
+                <a:path w="0" h="1254416">
+                  <a:moveTo>
+                    <a:pt x="0" y="1254416"/>
                   </a:moveTo>
                   <a:lnTo>
                     <a:pt x="0" y="0"/>
@@ -4606,18 +4606,18 @@
           </p:nvSpPr>
           <p:spPr>
             <a:xfrm>
-              <a:off x="5154822" y="5490932"/>
-              <a:ext cx="0" cy="242121"/>
-            </a:xfrm>
-            <a:custGeom>
-              <a:avLst/>
-              <a:pathLst>
-                <a:path w="0" h="242121">
-                  <a:moveTo>
-                    <a:pt x="0" y="0"/>
-                  </a:moveTo>
-                  <a:lnTo>
-                    <a:pt x="0" y="242121"/>
+              <a:off x="5288057" y="5414489"/>
+              <a:ext cx="0" cy="224561"/>
+            </a:xfrm>
+            <a:custGeom>
+              <a:avLst/>
+              <a:pathLst>
+                <a:path w="0" h="224561">
+                  <a:moveTo>
+                    <a:pt x="0" y="0"/>
+                  </a:moveTo>
+                  <a:lnTo>
+                    <a:pt x="0" y="224561"/>
                   </a:lnTo>
                 </a:path>
               </a:pathLst>
@@ -4646,24 +4646,24 @@
           </p:nvSpPr>
           <p:spPr>
             <a:xfrm>
-              <a:off x="4760746" y="4023973"/>
-              <a:ext cx="788150" cy="1466959"/>
-            </a:xfrm>
-            <a:custGeom>
-              <a:avLst/>
-              <a:pathLst>
-                <a:path w="788150" h="1466959">
-                  <a:moveTo>
-                    <a:pt x="0" y="0"/>
-                  </a:moveTo>
-                  <a:lnTo>
-                    <a:pt x="0" y="1466959"/>
-                  </a:lnTo>
-                  <a:lnTo>
-                    <a:pt x="788150" y="1466959"/>
-                  </a:lnTo>
-                  <a:lnTo>
-                    <a:pt x="788150" y="0"/>
+              <a:off x="4904844" y="4053923"/>
+              <a:ext cx="766427" cy="1360566"/>
+            </a:xfrm>
+            <a:custGeom>
+              <a:avLst/>
+              <a:pathLst>
+                <a:path w="766427" h="1360566">
+                  <a:moveTo>
+                    <a:pt x="0" y="0"/>
+                  </a:moveTo>
+                  <a:lnTo>
+                    <a:pt x="0" y="1360566"/>
+                  </a:lnTo>
+                  <a:lnTo>
+                    <a:pt x="766427" y="1360566"/>
+                  </a:lnTo>
+                  <a:lnTo>
+                    <a:pt x="766427" y="0"/>
                   </a:lnTo>
                   <a:close/>
                 </a:path>
@@ -4698,18 +4698,18 @@
           </p:nvSpPr>
           <p:spPr>
             <a:xfrm>
-              <a:off x="4760746" y="4696072"/>
-              <a:ext cx="788150" cy="0"/>
-            </a:xfrm>
-            <a:custGeom>
-              <a:avLst/>
-              <a:pathLst>
-                <a:path w="788150" h="0">
-                  <a:moveTo>
-                    <a:pt x="0" y="0"/>
-                  </a:moveTo>
-                  <a:lnTo>
-                    <a:pt x="788150" y="0"/>
+              <a:off x="4904844" y="4677277"/>
+              <a:ext cx="766427" cy="0"/>
+            </a:xfrm>
+            <a:custGeom>
+              <a:avLst/>
+              <a:pathLst>
+                <a:path w="766427" h="0">
+                  <a:moveTo>
+                    <a:pt x="0" y="0"/>
+                  </a:moveTo>
+                  <a:lnTo>
+                    <a:pt x="766427" y="0"/>
                   </a:lnTo>
                 </a:path>
               </a:pathLst>
@@ -4738,15 +4738,15 @@
           </p:nvSpPr>
           <p:spPr>
             <a:xfrm>
-              <a:off x="6205689" y="2217186"/>
-              <a:ext cx="0" cy="1164905"/>
-            </a:xfrm>
-            <a:custGeom>
-              <a:avLst/>
-              <a:pathLst>
-                <a:path w="0" h="1164905">
-                  <a:moveTo>
-                    <a:pt x="0" y="1164905"/>
+              <a:off x="6309960" y="2378175"/>
+              <a:ext cx="0" cy="1080419"/>
+            </a:xfrm>
+            <a:custGeom>
+              <a:avLst/>
+              <a:pathLst>
+                <a:path w="0" h="1080419">
+                  <a:moveTo>
+                    <a:pt x="0" y="1080419"/>
                   </a:moveTo>
                   <a:lnTo>
                     <a:pt x="0" y="0"/>
@@ -4778,18 +4778,18 @@
           </p:nvSpPr>
           <p:spPr>
             <a:xfrm>
-              <a:off x="6205689" y="5614196"/>
-              <a:ext cx="0" cy="967984"/>
-            </a:xfrm>
-            <a:custGeom>
-              <a:avLst/>
-              <a:pathLst>
-                <a:path w="0" h="967984">
-                  <a:moveTo>
-                    <a:pt x="0" y="0"/>
-                  </a:moveTo>
-                  <a:lnTo>
-                    <a:pt x="0" y="967984"/>
+              <a:off x="6309960" y="5528814"/>
+              <a:ext cx="0" cy="897780"/>
+            </a:xfrm>
+            <a:custGeom>
+              <a:avLst/>
+              <a:pathLst>
+                <a:path w="0" h="897780">
+                  <a:moveTo>
+                    <a:pt x="0" y="0"/>
+                  </a:moveTo>
+                  <a:lnTo>
+                    <a:pt x="0" y="897780"/>
                   </a:lnTo>
                 </a:path>
               </a:pathLst>
@@ -4818,24 +4818,24 @@
           </p:nvSpPr>
           <p:spPr>
             <a:xfrm>
-              <a:off x="5811614" y="3382091"/>
-              <a:ext cx="788150" cy="2232105"/>
-            </a:xfrm>
-            <a:custGeom>
-              <a:avLst/>
-              <a:pathLst>
-                <a:path w="788150" h="2232105">
-                  <a:moveTo>
-                    <a:pt x="0" y="0"/>
-                  </a:moveTo>
-                  <a:lnTo>
-                    <a:pt x="0" y="2232105"/>
-                  </a:lnTo>
-                  <a:lnTo>
-                    <a:pt x="788150" y="2232105"/>
-                  </a:lnTo>
-                  <a:lnTo>
-                    <a:pt x="788150" y="0"/>
+              <a:off x="5926747" y="3458594"/>
+              <a:ext cx="766427" cy="2070219"/>
+            </a:xfrm>
+            <a:custGeom>
+              <a:avLst/>
+              <a:pathLst>
+                <a:path w="766427" h="2070219">
+                  <a:moveTo>
+                    <a:pt x="0" y="0"/>
+                  </a:moveTo>
+                  <a:lnTo>
+                    <a:pt x="0" y="2070219"/>
+                  </a:lnTo>
+                  <a:lnTo>
+                    <a:pt x="766427" y="2070219"/>
+                  </a:lnTo>
+                  <a:lnTo>
+                    <a:pt x="766427" y="0"/>
                   </a:lnTo>
                   <a:close/>
                 </a:path>
@@ -4870,18 +4870,18 @@
           </p:nvSpPr>
           <p:spPr>
             <a:xfrm>
-              <a:off x="5811614" y="4822484"/>
-              <a:ext cx="788150" cy="0"/>
-            </a:xfrm>
-            <a:custGeom>
-              <a:avLst/>
-              <a:pathLst>
-                <a:path w="788150" h="0">
-                  <a:moveTo>
-                    <a:pt x="0" y="0"/>
-                  </a:moveTo>
-                  <a:lnTo>
-                    <a:pt x="788150" y="0"/>
+              <a:off x="5926747" y="4794521"/>
+              <a:ext cx="766427" cy="0"/>
+            </a:xfrm>
+            <a:custGeom>
+              <a:avLst/>
+              <a:pathLst>
+                <a:path w="766427" h="0">
+                  <a:moveTo>
+                    <a:pt x="0" y="0"/>
+                  </a:moveTo>
+                  <a:lnTo>
+                    <a:pt x="766427" y="0"/>
                   </a:lnTo>
                 </a:path>
               </a:pathLst>
@@ -4910,15 +4910,15 @@
           </p:nvSpPr>
           <p:spPr>
             <a:xfrm>
-              <a:off x="7256556" y="2454398"/>
-              <a:ext cx="0" cy="192639"/>
-            </a:xfrm>
-            <a:custGeom>
-              <a:avLst/>
-              <a:pathLst>
-                <a:path w="0" h="192639">
-                  <a:moveTo>
-                    <a:pt x="0" y="192639"/>
+              <a:off x="7331863" y="2598182"/>
+              <a:ext cx="0" cy="178668"/>
+            </a:xfrm>
+            <a:custGeom>
+              <a:avLst/>
+              <a:pathLst>
+                <a:path w="0" h="178668">
+                  <a:moveTo>
+                    <a:pt x="0" y="178668"/>
                   </a:moveTo>
                   <a:lnTo>
                     <a:pt x="0" y="0"/>
@@ -4950,18 +4950,18 @@
           </p:nvSpPr>
           <p:spPr>
             <a:xfrm>
-              <a:off x="7256556" y="3644233"/>
-              <a:ext cx="0" cy="824700"/>
-            </a:xfrm>
-            <a:custGeom>
-              <a:avLst/>
-              <a:pathLst>
-                <a:path w="0" h="824700">
-                  <a:moveTo>
-                    <a:pt x="0" y="0"/>
-                  </a:moveTo>
-                  <a:lnTo>
-                    <a:pt x="0" y="824700"/>
+              <a:off x="7331863" y="3701724"/>
+              <a:ext cx="0" cy="764888"/>
+            </a:xfrm>
+            <a:custGeom>
+              <a:avLst/>
+              <a:pathLst>
+                <a:path w="0" h="764888">
+                  <a:moveTo>
+                    <a:pt x="0" y="0"/>
+                  </a:moveTo>
+                  <a:lnTo>
+                    <a:pt x="0" y="764888"/>
                   </a:lnTo>
                 </a:path>
               </a:pathLst>
@@ -4990,24 +4990,24 @@
           </p:nvSpPr>
           <p:spPr>
             <a:xfrm>
-              <a:off x="6862481" y="2647038"/>
-              <a:ext cx="788150" cy="997194"/>
-            </a:xfrm>
-            <a:custGeom>
-              <a:avLst/>
-              <a:pathLst>
-                <a:path w="788150" h="997194">
-                  <a:moveTo>
-                    <a:pt x="0" y="0"/>
-                  </a:moveTo>
-                  <a:lnTo>
-                    <a:pt x="0" y="997194"/>
-                  </a:lnTo>
-                  <a:lnTo>
-                    <a:pt x="788150" y="997194"/>
-                  </a:lnTo>
-                  <a:lnTo>
-                    <a:pt x="788150" y="0"/>
+              <a:off x="6948650" y="2776851"/>
+              <a:ext cx="766427" cy="924872"/>
+            </a:xfrm>
+            <a:custGeom>
+              <a:avLst/>
+              <a:pathLst>
+                <a:path w="766427" h="924872">
+                  <a:moveTo>
+                    <a:pt x="0" y="0"/>
+                  </a:moveTo>
+                  <a:lnTo>
+                    <a:pt x="0" y="924872"/>
+                  </a:lnTo>
+                  <a:lnTo>
+                    <a:pt x="766427" y="924872"/>
+                  </a:lnTo>
+                  <a:lnTo>
+                    <a:pt x="766427" y="0"/>
                   </a:lnTo>
                   <a:close/>
                 </a:path>
@@ -5042,18 +5042,18 @@
           </p:nvSpPr>
           <p:spPr>
             <a:xfrm>
-              <a:off x="6862481" y="3185170"/>
-              <a:ext cx="788150" cy="0"/>
-            </a:xfrm>
-            <a:custGeom>
-              <a:avLst/>
-              <a:pathLst>
-                <a:path w="788150" h="0">
-                  <a:moveTo>
-                    <a:pt x="0" y="0"/>
-                  </a:moveTo>
-                  <a:lnTo>
-                    <a:pt x="788150" y="0"/>
+              <a:off x="6948650" y="3275955"/>
+              <a:ext cx="766427" cy="0"/>
+            </a:xfrm>
+            <a:custGeom>
+              <a:avLst/>
+              <a:pathLst>
+                <a:path w="766427" h="0">
+                  <a:moveTo>
+                    <a:pt x="0" y="0"/>
+                  </a:moveTo>
+                  <a:lnTo>
+                    <a:pt x="766427" y="0"/>
                   </a:lnTo>
                 </a:path>
               </a:pathLst>
@@ -5082,15 +5082,15 @@
           </p:nvSpPr>
           <p:spPr>
             <a:xfrm>
-              <a:off x="8307423" y="1644555"/>
-              <a:ext cx="0" cy="50363"/>
-            </a:xfrm>
-            <a:custGeom>
-              <a:avLst/>
-              <a:pathLst>
-                <a:path w="0" h="50363">
-                  <a:moveTo>
-                    <a:pt x="0" y="50363"/>
+              <a:off x="8353766" y="1847074"/>
+              <a:ext cx="0" cy="46710"/>
+            </a:xfrm>
+            <a:custGeom>
+              <a:avLst/>
+              <a:pathLst>
+                <a:path w="0" h="46710">
+                  <a:moveTo>
+                    <a:pt x="0" y="46710"/>
                   </a:moveTo>
                   <a:lnTo>
                     <a:pt x="0" y="0"/>
@@ -5122,18 +5122,18 @@
           </p:nvSpPr>
           <p:spPr>
             <a:xfrm>
-              <a:off x="8307423" y="2097825"/>
-              <a:ext cx="0" cy="604360"/>
-            </a:xfrm>
-            <a:custGeom>
-              <a:avLst/>
-              <a:pathLst>
-                <a:path w="0" h="604360">
-                  <a:moveTo>
-                    <a:pt x="0" y="0"/>
-                  </a:moveTo>
-                  <a:lnTo>
-                    <a:pt x="0" y="604360"/>
+              <a:off x="8353766" y="2267470"/>
+              <a:ext cx="0" cy="560528"/>
+            </a:xfrm>
+            <a:custGeom>
+              <a:avLst/>
+              <a:pathLst>
+                <a:path w="0" h="560528">
+                  <a:moveTo>
+                    <a:pt x="0" y="0"/>
+                  </a:moveTo>
+                  <a:lnTo>
+                    <a:pt x="0" y="560528"/>
                   </a:lnTo>
                 </a:path>
               </a:pathLst>
@@ -5162,24 +5162,24 @@
           </p:nvSpPr>
           <p:spPr>
             <a:xfrm>
-              <a:off x="7913348" y="1694918"/>
-              <a:ext cx="788150" cy="402907"/>
-            </a:xfrm>
-            <a:custGeom>
-              <a:avLst/>
-              <a:pathLst>
-                <a:path w="788150" h="402907">
-                  <a:moveTo>
-                    <a:pt x="0" y="0"/>
-                  </a:moveTo>
-                  <a:lnTo>
-                    <a:pt x="0" y="402907"/>
-                  </a:lnTo>
-                  <a:lnTo>
-                    <a:pt x="788150" y="402907"/>
-                  </a:lnTo>
-                  <a:lnTo>
-                    <a:pt x="788150" y="0"/>
+              <a:off x="7970552" y="1893785"/>
+              <a:ext cx="766427" cy="373685"/>
+            </a:xfrm>
+            <a:custGeom>
+              <a:avLst/>
+              <a:pathLst>
+                <a:path w="766427" h="373685">
+                  <a:moveTo>
+                    <a:pt x="0" y="0"/>
+                  </a:moveTo>
+                  <a:lnTo>
+                    <a:pt x="0" y="373685"/>
+                  </a:lnTo>
+                  <a:lnTo>
+                    <a:pt x="766427" y="373685"/>
+                  </a:lnTo>
+                  <a:lnTo>
+                    <a:pt x="766427" y="0"/>
                   </a:lnTo>
                   <a:close/>
                 </a:path>
@@ -5214,18 +5214,18 @@
           </p:nvSpPr>
           <p:spPr>
             <a:xfrm>
-              <a:off x="7913348" y="1896372"/>
-              <a:ext cx="788150" cy="0"/>
-            </a:xfrm>
-            <a:custGeom>
-              <a:avLst/>
-              <a:pathLst>
-                <a:path w="788150" h="0">
-                  <a:moveTo>
-                    <a:pt x="0" y="0"/>
-                  </a:moveTo>
-                  <a:lnTo>
-                    <a:pt x="788150" y="0"/>
+              <a:off x="7970552" y="2080628"/>
+              <a:ext cx="766427" cy="0"/>
+            </a:xfrm>
+            <a:custGeom>
+              <a:avLst/>
+              <a:pathLst>
+                <a:path w="766427" h="0">
+                  <a:moveTo>
+                    <a:pt x="0" y="0"/>
+                  </a:moveTo>
+                  <a:lnTo>
+                    <a:pt x="766427" y="0"/>
                   </a:lnTo>
                 </a:path>
               </a:pathLst>
@@ -5254,15 +5254,15 @@
           </p:nvSpPr>
           <p:spPr>
             <a:xfrm>
-              <a:off x="9358290" y="1654627"/>
-              <a:ext cx="0" cy="191380"/>
-            </a:xfrm>
-            <a:custGeom>
-              <a:avLst/>
-              <a:pathLst>
-                <a:path w="0" h="191380">
-                  <a:moveTo>
-                    <a:pt x="0" y="191380"/>
+              <a:off x="9375669" y="1856416"/>
+              <a:ext cx="0" cy="177500"/>
+            </a:xfrm>
+            <a:custGeom>
+              <a:avLst/>
+              <a:pathLst>
+                <a:path w="0" h="177500">
+                  <a:moveTo>
+                    <a:pt x="0" y="177500"/>
                   </a:moveTo>
                   <a:lnTo>
                     <a:pt x="0" y="0"/>
@@ -5294,18 +5294,18 @@
           </p:nvSpPr>
           <p:spPr>
             <a:xfrm>
-              <a:off x="9358290" y="2591386"/>
-              <a:ext cx="0" cy="1077776"/>
-            </a:xfrm>
-            <a:custGeom>
-              <a:avLst/>
-              <a:pathLst>
-                <a:path w="0" h="1077776">
-                  <a:moveTo>
-                    <a:pt x="0" y="0"/>
-                  </a:moveTo>
-                  <a:lnTo>
-                    <a:pt x="0" y="1077776"/>
+              <a:off x="9375669" y="2725236"/>
+              <a:ext cx="0" cy="999609"/>
+            </a:xfrm>
+            <a:custGeom>
+              <a:avLst/>
+              <a:pathLst>
+                <a:path w="0" h="999609">
+                  <a:moveTo>
+                    <a:pt x="0" y="0"/>
+                  </a:moveTo>
+                  <a:lnTo>
+                    <a:pt x="0" y="999609"/>
                   </a:lnTo>
                 </a:path>
               </a:pathLst>
@@ -5334,24 +5334,24 @@
           </p:nvSpPr>
           <p:spPr>
             <a:xfrm>
-              <a:off x="8964215" y="1846008"/>
-              <a:ext cx="788150" cy="745378"/>
-            </a:xfrm>
-            <a:custGeom>
-              <a:avLst/>
-              <a:pathLst>
-                <a:path w="788150" h="745378">
-                  <a:moveTo>
-                    <a:pt x="0" y="0"/>
-                  </a:moveTo>
-                  <a:lnTo>
-                    <a:pt x="0" y="745378"/>
-                  </a:lnTo>
-                  <a:lnTo>
-                    <a:pt x="788150" y="745378"/>
-                  </a:lnTo>
-                  <a:lnTo>
-                    <a:pt x="788150" y="0"/>
+              <a:off x="8992455" y="2033917"/>
+              <a:ext cx="766427" cy="691318"/>
+            </a:xfrm>
+            <a:custGeom>
+              <a:avLst/>
+              <a:pathLst>
+                <a:path w="766427" h="691318">
+                  <a:moveTo>
+                    <a:pt x="0" y="0"/>
+                  </a:moveTo>
+                  <a:lnTo>
+                    <a:pt x="0" y="691318"/>
+                  </a:lnTo>
+                  <a:lnTo>
+                    <a:pt x="766427" y="691318"/>
+                  </a:lnTo>
+                  <a:lnTo>
+                    <a:pt x="766427" y="0"/>
                   </a:lnTo>
                   <a:close/>
                 </a:path>
@@ -5386,18 +5386,18 @@
           </p:nvSpPr>
           <p:spPr>
             <a:xfrm>
-              <a:off x="8964215" y="2112934"/>
-              <a:ext cx="788150" cy="0"/>
-            </a:xfrm>
-            <a:custGeom>
-              <a:avLst/>
-              <a:pathLst>
-                <a:path w="788150" h="0">
-                  <a:moveTo>
-                    <a:pt x="0" y="0"/>
-                  </a:moveTo>
-                  <a:lnTo>
-                    <a:pt x="788150" y="0"/>
+              <a:off x="8992455" y="2281484"/>
+              <a:ext cx="766427" cy="0"/>
+            </a:xfrm>
+            <a:custGeom>
+              <a:avLst/>
+              <a:pathLst>
+                <a:path w="766427" h="0">
+                  <a:moveTo>
+                    <a:pt x="0" y="0"/>
+                  </a:moveTo>
+                  <a:lnTo>
+                    <a:pt x="766427" y="0"/>
                   </a:lnTo>
                 </a:path>
               </a:pathLst>
@@ -5426,8 +5426,8 @@
           </p:nvSpPr>
           <p:spPr>
             <a:xfrm>
-              <a:off x="1371700" y="1392990"/>
-              <a:ext cx="8617110" cy="5534432"/>
+              <a:off x="1609207" y="1613754"/>
+              <a:ext cx="8379603" cy="5133042"/>
             </a:xfrm>
             <a:prstGeom prst="rect">
               <a:avLst/>
@@ -5456,8 +5456,8 @@
           </p:nvSpPr>
           <p:spPr>
             <a:xfrm>
-              <a:off x="1253190" y="6641057"/>
-              <a:ext cx="55880" cy="76835"/>
+              <a:off x="1444977" y="6445718"/>
+              <a:ext cx="101600" cy="139700"/>
             </a:xfrm>
             <a:prstGeom prst="rect">
               <a:avLst/>
@@ -5470,7 +5470,7 @@
             <a:p>
               <a:pPr algn="l" marL="0" marR="0" indent="0">
                 <a:lnSpc>
-                  <a:spcPts val="880"/>
+                  <a:spcPts val="1600"/>
                 </a:lnSpc>
                 <a:spcBef>
                   <a:spcPts val="0"/>
@@ -5480,7 +5480,7 @@
                 </a:spcAft>
               </a:pPr>
               <a:r>
-                <a:rPr sz="880">
+                <a:rPr sz="1600">
                   <a:solidFill>
                     <a:srgbClr val="4D4D4D">
                       <a:alpha val="100000"/>
@@ -5502,8 +5502,8 @@
           </p:nvSpPr>
           <p:spPr>
             <a:xfrm>
-              <a:off x="1197310" y="5381972"/>
-              <a:ext cx="111760" cy="76835"/>
+              <a:off x="1343377" y="5277949"/>
+              <a:ext cx="203200" cy="139700"/>
             </a:xfrm>
             <a:prstGeom prst="rect">
               <a:avLst/>
@@ -5516,7 +5516,7 @@
             <a:p>
               <a:pPr algn="l" marL="0" marR="0" indent="0">
                 <a:lnSpc>
-                  <a:spcPts val="880"/>
+                  <a:spcPts val="1600"/>
                 </a:lnSpc>
                 <a:spcBef>
                   <a:spcPts val="0"/>
@@ -5526,7 +5526,7 @@
                 </a:spcAft>
               </a:pPr>
               <a:r>
-                <a:rPr sz="880">
+                <a:rPr sz="1600">
                   <a:solidFill>
                     <a:srgbClr val="4D4D4D">
                       <a:alpha val="100000"/>
@@ -5548,8 +5548,8 @@
           </p:nvSpPr>
           <p:spPr>
             <a:xfrm>
-              <a:off x="1197310" y="4122887"/>
-              <a:ext cx="111760" cy="76835"/>
+              <a:off x="1343377" y="4110181"/>
+              <a:ext cx="203200" cy="139700"/>
             </a:xfrm>
             <a:prstGeom prst="rect">
               <a:avLst/>
@@ -5562,7 +5562,7 @@
             <a:p>
               <a:pPr algn="l" marL="0" marR="0" indent="0">
                 <a:lnSpc>
-                  <a:spcPts val="880"/>
+                  <a:spcPts val="1600"/>
                 </a:lnSpc>
                 <a:spcBef>
                   <a:spcPts val="0"/>
@@ -5572,7 +5572,7 @@
                 </a:spcAft>
               </a:pPr>
               <a:r>
-                <a:rPr sz="880">
+                <a:rPr sz="1600">
                   <a:solidFill>
                     <a:srgbClr val="4D4D4D">
                       <a:alpha val="100000"/>
@@ -5594,8 +5594,8 @@
           </p:nvSpPr>
           <p:spPr>
             <a:xfrm>
-              <a:off x="1197310" y="2865113"/>
-              <a:ext cx="111760" cy="75525"/>
+              <a:off x="1343377" y="2944794"/>
+              <a:ext cx="203200" cy="137318"/>
             </a:xfrm>
             <a:prstGeom prst="rect">
               <a:avLst/>
@@ -5608,7 +5608,7 @@
             <a:p>
               <a:pPr algn="l" marL="0" marR="0" indent="0">
                 <a:lnSpc>
-                  <a:spcPts val="880"/>
+                  <a:spcPts val="1600"/>
                 </a:lnSpc>
                 <a:spcBef>
                   <a:spcPts val="0"/>
@@ -5618,7 +5618,7 @@
                 </a:spcAft>
               </a:pPr>
               <a:r>
-                <a:rPr sz="880">
+                <a:rPr sz="1600">
                   <a:solidFill>
                     <a:srgbClr val="4D4D4D">
                       <a:alpha val="100000"/>
@@ -5640,8 +5640,8 @@
           </p:nvSpPr>
           <p:spPr>
             <a:xfrm>
-              <a:off x="1141430" y="1604718"/>
-              <a:ext cx="167640" cy="76835"/>
+              <a:off x="1241777" y="1774644"/>
+              <a:ext cx="304800" cy="139700"/>
             </a:xfrm>
             <a:prstGeom prst="rect">
               <a:avLst/>
@@ -5654,7 +5654,7 @@
             <a:p>
               <a:pPr algn="l" marL="0" marR="0" indent="0">
                 <a:lnSpc>
-                  <a:spcPts val="880"/>
+                  <a:spcPts val="1600"/>
                 </a:lnSpc>
                 <a:spcBef>
                   <a:spcPts val="0"/>
@@ -5664,7 +5664,7 @@
                 </a:spcAft>
               </a:pPr>
               <a:r>
-                <a:rPr sz="880">
+                <a:rPr sz="1600">
                   <a:solidFill>
                     <a:srgbClr val="4D4D4D">
                       <a:alpha val="100000"/>
@@ -5686,7 +5686,7 @@
           </p:nvSpPr>
           <p:spPr>
             <a:xfrm>
-              <a:off x="1336905" y="6680893"/>
+              <a:off x="1574413" y="6518147"/>
               <a:ext cx="34794" cy="0"/>
             </a:xfrm>
             <a:custGeom>
@@ -5726,7 +5726,7 @@
           </p:nvSpPr>
           <p:spPr>
             <a:xfrm>
-              <a:off x="1336905" y="5421808"/>
+              <a:off x="1574413" y="5350379"/>
               <a:ext cx="34794" cy="0"/>
             </a:xfrm>
             <a:custGeom>
@@ -5766,7 +5766,7 @@
           </p:nvSpPr>
           <p:spPr>
             <a:xfrm>
-              <a:off x="1336905" y="4162724"/>
+              <a:off x="1574413" y="4182611"/>
               <a:ext cx="34794" cy="0"/>
             </a:xfrm>
             <a:custGeom>
@@ -5806,7 +5806,7 @@
           </p:nvSpPr>
           <p:spPr>
             <a:xfrm>
-              <a:off x="1336905" y="2903639"/>
+              <a:off x="1574413" y="3014842"/>
               <a:ext cx="34794" cy="0"/>
             </a:xfrm>
             <a:custGeom>
@@ -5846,7 +5846,7 @@
           </p:nvSpPr>
           <p:spPr>
             <a:xfrm>
-              <a:off x="1336905" y="1644555"/>
+              <a:off x="1574413" y="1847074"/>
               <a:ext cx="34794" cy="0"/>
             </a:xfrm>
             <a:custGeom>
@@ -5886,7 +5886,7 @@
           </p:nvSpPr>
           <p:spPr>
             <a:xfrm>
-              <a:off x="2002220" y="6927422"/>
+              <a:off x="2222349" y="6746796"/>
               <a:ext cx="0" cy="34794"/>
             </a:xfrm>
             <a:custGeom>
@@ -5926,7 +5926,7 @@
           </p:nvSpPr>
           <p:spPr>
             <a:xfrm>
-              <a:off x="3053087" y="6927422"/>
+              <a:off x="3244252" y="6746796"/>
               <a:ext cx="0" cy="34794"/>
             </a:xfrm>
             <a:custGeom>
@@ -5966,7 +5966,7 @@
           </p:nvSpPr>
           <p:spPr>
             <a:xfrm>
-              <a:off x="4103955" y="6927422"/>
+              <a:off x="4266155" y="6746796"/>
               <a:ext cx="0" cy="34794"/>
             </a:xfrm>
             <a:custGeom>
@@ -6006,7 +6006,7 @@
           </p:nvSpPr>
           <p:spPr>
             <a:xfrm>
-              <a:off x="5154822" y="6927422"/>
+              <a:off x="5288057" y="6746796"/>
               <a:ext cx="0" cy="34794"/>
             </a:xfrm>
             <a:custGeom>
@@ -6046,7 +6046,7 @@
           </p:nvSpPr>
           <p:spPr>
             <a:xfrm>
-              <a:off x="6205689" y="6927422"/>
+              <a:off x="6309960" y="6746796"/>
               <a:ext cx="0" cy="34794"/>
             </a:xfrm>
             <a:custGeom>
@@ -6086,7 +6086,7 @@
           </p:nvSpPr>
           <p:spPr>
             <a:xfrm>
-              <a:off x="7256556" y="6927422"/>
+              <a:off x="7331863" y="6746796"/>
               <a:ext cx="0" cy="34794"/>
             </a:xfrm>
             <a:custGeom>
@@ -6126,7 +6126,7 @@
           </p:nvSpPr>
           <p:spPr>
             <a:xfrm>
-              <a:off x="8307423" y="6927422"/>
+              <a:off x="8353766" y="6746796"/>
               <a:ext cx="0" cy="34794"/>
             </a:xfrm>
             <a:custGeom>
@@ -6166,7 +6166,7 @@
           </p:nvSpPr>
           <p:spPr>
             <a:xfrm>
-              <a:off x="9358290" y="6927422"/>
+              <a:off x="9375669" y="6746796"/>
               <a:ext cx="0" cy="34794"/>
             </a:xfrm>
             <a:custGeom>
@@ -6206,8 +6206,8 @@
           </p:nvSpPr>
           <p:spPr>
             <a:xfrm>
-              <a:off x="1785003" y="6984922"/>
-              <a:ext cx="434434" cy="79126"/>
+              <a:off x="1827409" y="6800100"/>
+              <a:ext cx="789880" cy="143867"/>
             </a:xfrm>
             <a:prstGeom prst="rect">
               <a:avLst/>
@@ -6220,7 +6220,7 @@
             <a:p>
               <a:pPr algn="l" marL="0" marR="0" indent="0">
                 <a:lnSpc>
-                  <a:spcPts val="880"/>
+                  <a:spcPts val="1600"/>
                 </a:lnSpc>
                 <a:spcBef>
                   <a:spcPts val="0"/>
@@ -6230,7 +6230,7 @@
                 </a:spcAft>
               </a:pPr>
               <a:r>
-                <a:rPr sz="880">
+                <a:rPr sz="1600">
                   <a:solidFill>
                     <a:srgbClr val="4D4D4D">
                       <a:alpha val="100000"/>
@@ -6252,8 +6252,8 @@
           </p:nvSpPr>
           <p:spPr>
             <a:xfrm>
-              <a:off x="2773715" y="6962330"/>
-              <a:ext cx="558745" cy="101719"/>
+              <a:off x="2736301" y="6759023"/>
+              <a:ext cx="1015900" cy="184943"/>
             </a:xfrm>
             <a:prstGeom prst="rect">
               <a:avLst/>
@@ -6266,7 +6266,7 @@
             <a:p>
               <a:pPr algn="l" marL="0" marR="0" indent="0">
                 <a:lnSpc>
-                  <a:spcPts val="880"/>
+                  <a:spcPts val="1600"/>
                 </a:lnSpc>
                 <a:spcBef>
                   <a:spcPts val="0"/>
@@ -6276,7 +6276,7 @@
                 </a:spcAft>
               </a:pPr>
               <a:r>
-                <a:rPr sz="880">
+                <a:rPr sz="1600">
                   <a:solidFill>
                     <a:srgbClr val="4D4D4D">
                       <a:alpha val="100000"/>
@@ -6298,8 +6298,8 @@
           </p:nvSpPr>
           <p:spPr>
             <a:xfrm>
-              <a:off x="3920844" y="6984922"/>
-              <a:ext cx="366221" cy="79126"/>
+              <a:off x="3933226" y="6800100"/>
+              <a:ext cx="665857" cy="143867"/>
             </a:xfrm>
             <a:prstGeom prst="rect">
               <a:avLst/>
@@ -6312,7 +6312,7 @@
             <a:p>
               <a:pPr algn="l" marL="0" marR="0" indent="0">
                 <a:lnSpc>
-                  <a:spcPts val="880"/>
+                  <a:spcPts val="1600"/>
                 </a:lnSpc>
                 <a:spcBef>
                   <a:spcPts val="0"/>
@@ -6322,7 +6322,7 @@
                 </a:spcAft>
               </a:pPr>
               <a:r>
-                <a:rPr sz="880">
+                <a:rPr sz="1600">
                   <a:solidFill>
                     <a:srgbClr val="4D4D4D">
                       <a:alpha val="100000"/>
@@ -6344,8 +6344,8 @@
           </p:nvSpPr>
           <p:spPr>
             <a:xfrm>
-              <a:off x="4863116" y="6984922"/>
-              <a:ext cx="583411" cy="79126"/>
+              <a:off x="4757684" y="6800100"/>
+              <a:ext cx="1060747" cy="143867"/>
             </a:xfrm>
             <a:prstGeom prst="rect">
               <a:avLst/>
@@ -6358,7 +6358,7 @@
             <a:p>
               <a:pPr algn="l" marL="0" marR="0" indent="0">
                 <a:lnSpc>
-                  <a:spcPts val="880"/>
+                  <a:spcPts val="1600"/>
                 </a:lnSpc>
                 <a:spcBef>
                   <a:spcPts val="0"/>
@@ -6368,7 +6368,7 @@
                 </a:spcAft>
               </a:pPr>
               <a:r>
-                <a:rPr sz="880">
+                <a:rPr sz="1600">
                   <a:solidFill>
                     <a:srgbClr val="4D4D4D">
                       <a:alpha val="100000"/>
@@ -6390,8 +6390,8 @@
           </p:nvSpPr>
           <p:spPr>
             <a:xfrm>
-              <a:off x="6016412" y="6985413"/>
-              <a:ext cx="378554" cy="78635"/>
+              <a:off x="5965820" y="6800993"/>
+              <a:ext cx="688280" cy="142974"/>
             </a:xfrm>
             <a:prstGeom prst="rect">
               <a:avLst/>
@@ -6404,7 +6404,7 @@
             <a:p>
               <a:pPr algn="l" marL="0" marR="0" indent="0">
                 <a:lnSpc>
-                  <a:spcPts val="880"/>
+                  <a:spcPts val="1600"/>
                 </a:lnSpc>
                 <a:spcBef>
                   <a:spcPts val="0"/>
@@ -6414,7 +6414,7 @@
                 </a:spcAft>
               </a:pPr>
               <a:r>
-                <a:rPr sz="880">
+                <a:rPr sz="1600">
                   <a:solidFill>
                     <a:srgbClr val="4D4D4D">
                       <a:alpha val="100000"/>
@@ -6436,8 +6436,8 @@
           </p:nvSpPr>
           <p:spPr>
             <a:xfrm>
-              <a:off x="6983377" y="6962330"/>
-              <a:ext cx="546357" cy="101719"/>
+              <a:off x="6835174" y="6759023"/>
+              <a:ext cx="993378" cy="184943"/>
             </a:xfrm>
             <a:prstGeom prst="rect">
               <a:avLst/>
@@ -6450,7 +6450,7 @@
             <a:p>
               <a:pPr algn="l" marL="0" marR="0" indent="0">
                 <a:lnSpc>
-                  <a:spcPts val="880"/>
+                  <a:spcPts val="1600"/>
                 </a:lnSpc>
                 <a:spcBef>
                   <a:spcPts val="0"/>
@@ -6460,7 +6460,7 @@
                 </a:spcAft>
               </a:pPr>
               <a:r>
-                <a:rPr sz="880">
+                <a:rPr sz="1600">
                   <a:solidFill>
                     <a:srgbClr val="4D4D4D">
                       <a:alpha val="100000"/>
@@ -6482,8 +6482,8 @@
           </p:nvSpPr>
           <p:spPr>
             <a:xfrm>
-              <a:off x="7987723" y="6962548"/>
-              <a:ext cx="639400" cy="101500"/>
+              <a:off x="7772493" y="6759420"/>
+              <a:ext cx="1162546" cy="184546"/>
             </a:xfrm>
             <a:prstGeom prst="rect">
               <a:avLst/>
@@ -6496,7 +6496,7 @@
             <a:p>
               <a:pPr algn="l" marL="0" marR="0" indent="0">
                 <a:lnSpc>
-                  <a:spcPts val="880"/>
+                  <a:spcPts val="1600"/>
                 </a:lnSpc>
                 <a:spcBef>
                   <a:spcPts val="0"/>
@@ -6506,7 +6506,7 @@
                 </a:spcAft>
               </a:pPr>
               <a:r>
-                <a:rPr sz="880">
+                <a:rPr sz="1600">
                   <a:solidFill>
                     <a:srgbClr val="4D4D4D">
                       <a:alpha val="100000"/>
@@ -6528,8 +6528,8 @@
           </p:nvSpPr>
           <p:spPr>
             <a:xfrm>
-              <a:off x="9072724" y="6962330"/>
-              <a:ext cx="571132" cy="101719"/>
+              <a:off x="8856457" y="6759023"/>
+              <a:ext cx="1038423" cy="184943"/>
             </a:xfrm>
             <a:prstGeom prst="rect">
               <a:avLst/>
@@ -6542,7 +6542,7 @@
             <a:p>
               <a:pPr algn="l" marL="0" marR="0" indent="0">
                 <a:lnSpc>
-                  <a:spcPts val="880"/>
+                  <a:spcPts val="1600"/>
                 </a:lnSpc>
                 <a:spcBef>
                   <a:spcPts val="0"/>
@@ -6552,7 +6552,7 @@
                 </a:spcAft>
               </a:pPr>
               <a:r>
-                <a:rPr sz="880">
+                <a:rPr sz="1600">
                   <a:solidFill>
                     <a:srgbClr val="4D4D4D">
                       <a:alpha val="100000"/>
@@ -6574,8 +6574,8 @@
           </p:nvSpPr>
           <p:spPr>
             <a:xfrm>
-              <a:off x="5517329" y="7116347"/>
-              <a:ext cx="325852" cy="99113"/>
+              <a:off x="5502779" y="7010586"/>
+              <a:ext cx="592459" cy="180206"/>
             </a:xfrm>
             <a:prstGeom prst="rect">
               <a:avLst/>
@@ -6588,7 +6588,7 @@
             <a:p>
               <a:pPr algn="l" marL="0" marR="0" indent="0">
                 <a:lnSpc>
-                  <a:spcPts val="1100"/>
+                  <a:spcPts val="2000"/>
                 </a:lnSpc>
                 <a:spcBef>
                   <a:spcPts val="0"/>
@@ -6598,7 +6598,7 @@
                 </a:spcAft>
               </a:pPr>
               <a:r>
-                <a:rPr sz="1100">
+                <a:rPr sz="2000">
                   <a:solidFill>
                     <a:srgbClr val="000000">
                       <a:alpha val="100000"/>
@@ -6620,8 +6620,8 @@
           </p:nvSpPr>
           <p:spPr>
             <a:xfrm rot="-5400000">
-              <a:off x="444663" y="4096768"/>
-              <a:ext cx="1136767" cy="126875"/>
+              <a:off x="3397" y="4064933"/>
+              <a:ext cx="2066850" cy="230683"/>
             </a:xfrm>
             <a:prstGeom prst="rect">
               <a:avLst/>
@@ -6634,7 +6634,7 @@
             <a:p>
               <a:pPr algn="l" marL="0" marR="0" indent="0">
                 <a:lnSpc>
-                  <a:spcPts val="1100"/>
+                  <a:spcPts val="2000"/>
                 </a:lnSpc>
                 <a:spcBef>
                   <a:spcPts val="0"/>
@@ -6644,7 +6644,7 @@
                 </a:spcAft>
               </a:pPr>
               <a:r>
-                <a:rPr sz="1100">
+                <a:rPr sz="2000">
                   <a:solidFill>
                     <a:srgbClr val="000000">
                       <a:alpha val="100000"/>
@@ -6666,8 +6666,8 @@
           </p:nvSpPr>
           <p:spPr>
             <a:xfrm>
-              <a:off x="1371700" y="1166102"/>
-              <a:ext cx="1171692" cy="127148"/>
+              <a:off x="1609207" y="1258167"/>
+              <a:ext cx="2130350" cy="231179"/>
             </a:xfrm>
             <a:prstGeom prst="rect">
               <a:avLst/>
@@ -6680,7 +6680,7 @@
             <a:p>
               <a:pPr algn="l" marL="0" marR="0" indent="0">
                 <a:lnSpc>
-                  <a:spcPts val="1100"/>
+                  <a:spcPts val="2000"/>
                 </a:lnSpc>
                 <a:spcBef>
                   <a:spcPts val="0"/>
@@ -6690,7 +6690,7 @@
                 </a:spcAft>
               </a:pPr>
               <a:r>
-                <a:rPr sz="1100">
+                <a:rPr sz="2000">
                   <a:solidFill>
                     <a:srgbClr val="000000">
                       <a:alpha val="100000"/>
@@ -6712,8 +6712,8 @@
           </p:nvSpPr>
           <p:spPr>
             <a:xfrm>
-              <a:off x="1371700" y="942733"/>
-              <a:ext cx="2216318" cy="152251"/>
+              <a:off x="1609207" y="908979"/>
+              <a:ext cx="4029670" cy="276820"/>
             </a:xfrm>
             <a:prstGeom prst="rect">
               <a:avLst/>
@@ -6726,7 +6726,7 @@
             <a:p>
               <a:pPr algn="l" marL="0" marR="0" indent="0">
                 <a:lnSpc>
-                  <a:spcPts val="1320"/>
+                  <a:spcPts val="2400"/>
                 </a:lnSpc>
                 <a:spcBef>
                   <a:spcPts val="0"/>
@@ -6736,7 +6736,7 @@
                 </a:spcAft>
               </a:pPr>
               <a:r>
-                <a:rPr sz="1320">
+                <a:rPr sz="2400">
                   <a:solidFill>
                     <a:srgbClr val="000000">
                       <a:alpha val="100000"/>

</xml_diff>